<commit_message>
comeback for past codes with grid dataset
</commit_message>
<xml_diff>
--- a/Deliverables/PPT_Projeto.pptx
+++ b/Deliverables/PPT_Projeto.pptx
@@ -5,37 +5,43 @@
     <p:sldMasterId id="2147483648" r:id="rId4"/>
   </p:sldMasterIdLst>
   <p:notesMasterIdLst>
-    <p:notesMasterId r:id="rId30"/>
+    <p:notesMasterId r:id="rId36"/>
   </p:notesMasterIdLst>
   <p:handoutMasterIdLst>
-    <p:handoutMasterId r:id="rId31"/>
+    <p:handoutMasterId r:id="rId37"/>
   </p:handoutMasterIdLst>
   <p:sldIdLst>
     <p:sldId id="256" r:id="rId5"/>
     <p:sldId id="258" r:id="rId6"/>
-    <p:sldId id="259" r:id="rId7"/>
-    <p:sldId id="270" r:id="rId8"/>
-    <p:sldId id="271" r:id="rId9"/>
-    <p:sldId id="260" r:id="rId10"/>
-    <p:sldId id="269" r:id="rId11"/>
-    <p:sldId id="272" r:id="rId12"/>
-    <p:sldId id="261" r:id="rId13"/>
-    <p:sldId id="273" r:id="rId14"/>
-    <p:sldId id="268" r:id="rId15"/>
-    <p:sldId id="262" r:id="rId16"/>
-    <p:sldId id="267" r:id="rId17"/>
-    <p:sldId id="274" r:id="rId18"/>
-    <p:sldId id="263" r:id="rId19"/>
-    <p:sldId id="266" r:id="rId20"/>
-    <p:sldId id="275" r:id="rId21"/>
-    <p:sldId id="264" r:id="rId22"/>
-    <p:sldId id="265" r:id="rId23"/>
-    <p:sldId id="276" r:id="rId24"/>
-    <p:sldId id="280" r:id="rId25"/>
-    <p:sldId id="277" r:id="rId26"/>
-    <p:sldId id="278" r:id="rId27"/>
-    <p:sldId id="279" r:id="rId28"/>
-    <p:sldId id="281" r:id="rId29"/>
+    <p:sldId id="283" r:id="rId7"/>
+    <p:sldId id="282" r:id="rId8"/>
+    <p:sldId id="259" r:id="rId9"/>
+    <p:sldId id="270" r:id="rId10"/>
+    <p:sldId id="271" r:id="rId11"/>
+    <p:sldId id="260" r:id="rId12"/>
+    <p:sldId id="269" r:id="rId13"/>
+    <p:sldId id="272" r:id="rId14"/>
+    <p:sldId id="261" r:id="rId15"/>
+    <p:sldId id="273" r:id="rId16"/>
+    <p:sldId id="268" r:id="rId17"/>
+    <p:sldId id="262" r:id="rId18"/>
+    <p:sldId id="267" r:id="rId19"/>
+    <p:sldId id="274" r:id="rId20"/>
+    <p:sldId id="263" r:id="rId21"/>
+    <p:sldId id="266" r:id="rId22"/>
+    <p:sldId id="275" r:id="rId23"/>
+    <p:sldId id="264" r:id="rId24"/>
+    <p:sldId id="265" r:id="rId25"/>
+    <p:sldId id="276" r:id="rId26"/>
+    <p:sldId id="280" r:id="rId27"/>
+    <p:sldId id="277" r:id="rId28"/>
+    <p:sldId id="286" r:id="rId29"/>
+    <p:sldId id="284" r:id="rId30"/>
+    <p:sldId id="278" r:id="rId31"/>
+    <p:sldId id="279" r:id="rId32"/>
+    <p:sldId id="281" r:id="rId33"/>
+    <p:sldId id="285" r:id="rId34"/>
+    <p:sldId id="287" r:id="rId35"/>
   </p:sldIdLst>
   <p:sldSz cx="12192000" cy="6858000"/>
   <p:notesSz cx="6858000" cy="9144000"/>
@@ -253,7 +259,7 @@
             <a:pPr rtl="0"/>
             <a:fld id="{DBDA4D0B-D289-44C5-ACD1-1D74B1774596}" type="datetime1">
               <a:rPr lang="pt-PT" smtClean="0"/>
-              <a:t>19/05/2025</a:t>
+              <a:t>28/05/2025</a:t>
             </a:fld>
             <a:endParaRPr lang="pt-PT" dirty="0"/>
           </a:p>
@@ -435,7 +441,7 @@
             <a:fld id="{6A39EF8C-F73B-419C-893B-8D7151F15D37}" type="datetime1">
               <a:rPr lang="pt-PT" smtClean="0"/>
               <a:pPr/>
-              <a:t>19/05/2025</a:t>
+              <a:t>28/05/2025</a:t>
             </a:fld>
             <a:endParaRPr lang="pt-PT" dirty="0"/>
           </a:p>
@@ -858,7 +864,7 @@
             <a:pPr rtl="0"/>
             <a:fld id="{35BAF473-2665-42A7-89E3-C7BA7EB58D12}" type="slidenum">
               <a:rPr lang="pt-PT" noProof="0" smtClean="0"/>
-              <a:t>24</a:t>
+              <a:t>28</a:t>
             </a:fld>
             <a:endParaRPr lang="pt-PT" noProof="0"/>
           </a:p>
@@ -9169,7 +9175,359 @@
 </file>
 
 <file path=ppt/slides/slide10.xml><?xml version="1.0" encoding="utf-8"?>
-<p:sld xmlns:a="http://schemas.openxmlformats.org/drawingml/2006/main" xmlns:r="http://schemas.openxmlformats.org/officeDocument/2006/relationships" xmlns:p="http://schemas.openxmlformats.org/presentationml/2006/main">
+<p:sld xmlns:a="http://schemas.openxmlformats.org/drawingml/2006/main" xmlns:r="http://schemas.openxmlformats.org/officeDocument/2006/relationships" xmlns:p="http://schemas.openxmlformats.org/presentationml/2006/main" show="0">
+  <p:cSld>
+    <p:spTree>
+      <p:nvGrpSpPr>
+        <p:cNvPr id="1" name="">
+          <a:extLst>
+            <a:ext uri="{FF2B5EF4-FFF2-40B4-BE49-F238E27FC236}">
+              <a16:creationId xmlns:a16="http://schemas.microsoft.com/office/drawing/2014/main" id="{74E82592-AE30-A049-9E5C-8AAD57F9024E}"/>
+            </a:ext>
+          </a:extLst>
+        </p:cNvPr>
+        <p:cNvGrpSpPr/>
+        <p:nvPr/>
+      </p:nvGrpSpPr>
+      <p:grpSpPr>
+        <a:xfrm>
+          <a:off x="0" y="0"/>
+          <a:ext cx="0" cy="0"/>
+          <a:chOff x="0" y="0"/>
+          <a:chExt cx="0" cy="0"/>
+        </a:xfrm>
+      </p:grpSpPr>
+      <p:sp>
+        <p:nvSpPr>
+          <p:cNvPr id="2" name="Title 1">
+            <a:extLst>
+              <a:ext uri="{FF2B5EF4-FFF2-40B4-BE49-F238E27FC236}">
+                <a16:creationId xmlns:a16="http://schemas.microsoft.com/office/drawing/2014/main" id="{750CD660-1A7E-31C5-4DF6-8CA8D4775B64}"/>
+              </a:ext>
+            </a:extLst>
+          </p:cNvPr>
+          <p:cNvSpPr>
+            <a:spLocks noGrp="1"/>
+          </p:cNvSpPr>
+          <p:nvPr>
+            <p:ph type="title"/>
+          </p:nvPr>
+        </p:nvSpPr>
+        <p:spPr>
+          <a:xfrm>
+            <a:off x="3253740" y="259589"/>
+            <a:ext cx="5684520" cy="821815"/>
+          </a:xfrm>
+        </p:spPr>
+        <p:txBody>
+          <a:bodyPr>
+            <a:normAutofit/>
+          </a:bodyPr>
+          <a:lstStyle/>
+          <a:p>
+            <a:r>
+              <a:rPr lang="pt-PT" dirty="0"/>
+              <a:t>Variabilidade NO2</a:t>
+            </a:r>
+          </a:p>
+        </p:txBody>
+      </p:sp>
+      <p:sp>
+        <p:nvSpPr>
+          <p:cNvPr id="6" name="Slide Number Placeholder 5">
+            <a:extLst>
+              <a:ext uri="{FF2B5EF4-FFF2-40B4-BE49-F238E27FC236}">
+                <a16:creationId xmlns:a16="http://schemas.microsoft.com/office/drawing/2014/main" id="{36B05E35-6DF7-329F-9F32-9937C69CCBBC}"/>
+              </a:ext>
+            </a:extLst>
+          </p:cNvPr>
+          <p:cNvSpPr>
+            <a:spLocks noGrp="1"/>
+          </p:cNvSpPr>
+          <p:nvPr>
+            <p:ph type="sldNum" sz="quarter" idx="12"/>
+          </p:nvPr>
+        </p:nvSpPr>
+        <p:spPr/>
+        <p:txBody>
+          <a:bodyPr/>
+          <a:lstStyle/>
+          <a:p>
+            <a:pPr rtl="0"/>
+            <a:fld id="{B5CEABB6-07DC-46E8-9B57-56EC44A396E5}" type="slidenum">
+              <a:rPr lang="pt-PT" noProof="0" smtClean="0"/>
+              <a:pPr rtl="0"/>
+              <a:t>10</a:t>
+            </a:fld>
+            <a:endParaRPr lang="pt-PT" noProof="0"/>
+          </a:p>
+        </p:txBody>
+      </p:sp>
+      <p:pic>
+        <p:nvPicPr>
+          <p:cNvPr id="4" name="Picture 3" descr="A graph of blue squares&#10;&#10;AI-generated content may be incorrect.">
+            <a:extLst>
+              <a:ext uri="{FF2B5EF4-FFF2-40B4-BE49-F238E27FC236}">
+                <a16:creationId xmlns:a16="http://schemas.microsoft.com/office/drawing/2014/main" id="{86AEF84D-594D-808E-4AE7-BC76051E7716}"/>
+              </a:ext>
+            </a:extLst>
+          </p:cNvPr>
+          <p:cNvPicPr>
+            <a:picLocks noChangeAspect="1"/>
+          </p:cNvPicPr>
+          <p:nvPr/>
+        </p:nvPicPr>
+        <p:blipFill>
+          <a:blip r:embed="rId2"/>
+          <a:stretch>
+            <a:fillRect/>
+          </a:stretch>
+        </p:blipFill>
+        <p:spPr>
+          <a:xfrm>
+            <a:off x="0" y="1081088"/>
+            <a:ext cx="5772145" cy="2861820"/>
+          </a:xfrm>
+          <a:prstGeom prst="rect">
+            <a:avLst/>
+          </a:prstGeom>
+        </p:spPr>
+      </p:pic>
+      <p:pic>
+        <p:nvPicPr>
+          <p:cNvPr id="9" name="Picture 8" descr="A graph of blue squares&#10;&#10;AI-generated content may be incorrect.">
+            <a:extLst>
+              <a:ext uri="{FF2B5EF4-FFF2-40B4-BE49-F238E27FC236}">
+                <a16:creationId xmlns:a16="http://schemas.microsoft.com/office/drawing/2014/main" id="{BEFA5603-46FA-D5B4-402A-F0094BDEC39E}"/>
+              </a:ext>
+            </a:extLst>
+          </p:cNvPr>
+          <p:cNvPicPr>
+            <a:picLocks noChangeAspect="1"/>
+          </p:cNvPicPr>
+          <p:nvPr/>
+        </p:nvPicPr>
+        <p:blipFill>
+          <a:blip r:embed="rId3"/>
+          <a:stretch>
+            <a:fillRect/>
+          </a:stretch>
+        </p:blipFill>
+        <p:spPr>
+          <a:xfrm>
+            <a:off x="0" y="3996180"/>
+            <a:ext cx="5767294" cy="2861820"/>
+          </a:xfrm>
+          <a:prstGeom prst="rect">
+            <a:avLst/>
+          </a:prstGeom>
+        </p:spPr>
+      </p:pic>
+      <p:pic>
+        <p:nvPicPr>
+          <p:cNvPr id="15" name="Picture 14" descr="A graph of blue squares&#10;&#10;AI-generated content may be incorrect.">
+            <a:extLst>
+              <a:ext uri="{FF2B5EF4-FFF2-40B4-BE49-F238E27FC236}">
+                <a16:creationId xmlns:a16="http://schemas.microsoft.com/office/drawing/2014/main" id="{1D96CD75-61F1-0FF0-368C-6FBB9CA4AD49}"/>
+              </a:ext>
+            </a:extLst>
+          </p:cNvPr>
+          <p:cNvPicPr>
+            <a:picLocks noChangeAspect="1"/>
+          </p:cNvPicPr>
+          <p:nvPr/>
+        </p:nvPicPr>
+        <p:blipFill>
+          <a:blip r:embed="rId4"/>
+          <a:stretch>
+            <a:fillRect/>
+          </a:stretch>
+        </p:blipFill>
+        <p:spPr>
+          <a:xfrm>
+            <a:off x="6419854" y="1081088"/>
+            <a:ext cx="5772145" cy="2864227"/>
+          </a:xfrm>
+          <a:prstGeom prst="rect">
+            <a:avLst/>
+          </a:prstGeom>
+        </p:spPr>
+      </p:pic>
+      <p:pic>
+        <p:nvPicPr>
+          <p:cNvPr id="17" name="Picture 16" descr="A graph of blue squares&#10;&#10;AI-generated content may be incorrect.">
+            <a:extLst>
+              <a:ext uri="{FF2B5EF4-FFF2-40B4-BE49-F238E27FC236}">
+                <a16:creationId xmlns:a16="http://schemas.microsoft.com/office/drawing/2014/main" id="{4621085C-A5E0-D694-DAB6-A83D1BCD69C0}"/>
+              </a:ext>
+            </a:extLst>
+          </p:cNvPr>
+          <p:cNvPicPr>
+            <a:picLocks noChangeAspect="1"/>
+          </p:cNvPicPr>
+          <p:nvPr/>
+        </p:nvPicPr>
+        <p:blipFill>
+          <a:blip r:embed="rId5"/>
+          <a:stretch>
+            <a:fillRect/>
+          </a:stretch>
+        </p:blipFill>
+        <p:spPr>
+          <a:xfrm>
+            <a:off x="6419854" y="3993773"/>
+            <a:ext cx="5772146" cy="2864227"/>
+          </a:xfrm>
+          <a:prstGeom prst="rect">
+            <a:avLst/>
+          </a:prstGeom>
+        </p:spPr>
+      </p:pic>
+    </p:spTree>
+    <p:extLst>
+      <p:ext uri="{BB962C8B-B14F-4D97-AF65-F5344CB8AC3E}">
+        <p14:creationId xmlns:p14="http://schemas.microsoft.com/office/powerpoint/2010/main" val="14021505"/>
+      </p:ext>
+    </p:extLst>
+  </p:cSld>
+  <p:clrMapOvr>
+    <a:masterClrMapping/>
+  </p:clrMapOvr>
+</p:sld>
+</file>
+
+<file path=ppt/slides/slide11.xml><?xml version="1.0" encoding="utf-8"?>
+<p:sld xmlns:a="http://schemas.openxmlformats.org/drawingml/2006/main" xmlns:r="http://schemas.openxmlformats.org/officeDocument/2006/relationships" xmlns:p="http://schemas.openxmlformats.org/presentationml/2006/main" show="0">
+  <p:cSld>
+    <p:spTree>
+      <p:nvGrpSpPr>
+        <p:cNvPr id="1" name="">
+          <a:extLst>
+            <a:ext uri="{FF2B5EF4-FFF2-40B4-BE49-F238E27FC236}">
+              <a16:creationId xmlns:a16="http://schemas.microsoft.com/office/drawing/2014/main" id="{5511CA13-20B2-E4C8-0D0C-800766284FE5}"/>
+            </a:ext>
+          </a:extLst>
+        </p:cNvPr>
+        <p:cNvGrpSpPr/>
+        <p:nvPr/>
+      </p:nvGrpSpPr>
+      <p:grpSpPr>
+        <a:xfrm>
+          <a:off x="0" y="0"/>
+          <a:ext cx="0" cy="0"/>
+          <a:chOff x="0" y="0"/>
+          <a:chExt cx="0" cy="0"/>
+        </a:xfrm>
+      </p:grpSpPr>
+      <p:sp>
+        <p:nvSpPr>
+          <p:cNvPr id="2" name="Title 1">
+            <a:extLst>
+              <a:ext uri="{FF2B5EF4-FFF2-40B4-BE49-F238E27FC236}">
+                <a16:creationId xmlns:a16="http://schemas.microsoft.com/office/drawing/2014/main" id="{D7D2825B-47A0-31B8-D396-C1FF9762A165}"/>
+              </a:ext>
+            </a:extLst>
+          </p:cNvPr>
+          <p:cNvSpPr>
+            <a:spLocks noGrp="1"/>
+          </p:cNvSpPr>
+          <p:nvPr>
+            <p:ph type="title"/>
+          </p:nvPr>
+        </p:nvSpPr>
+        <p:spPr>
+          <a:xfrm>
+            <a:off x="3253740" y="259589"/>
+            <a:ext cx="5684520" cy="821815"/>
+          </a:xfrm>
+        </p:spPr>
+        <p:txBody>
+          <a:bodyPr/>
+          <a:lstStyle/>
+          <a:p>
+            <a:r>
+              <a:rPr lang="pt-PT" dirty="0"/>
+              <a:t>Time Series NO</a:t>
+            </a:r>
+          </a:p>
+        </p:txBody>
+      </p:sp>
+      <p:sp>
+        <p:nvSpPr>
+          <p:cNvPr id="6" name="Slide Number Placeholder 5">
+            <a:extLst>
+              <a:ext uri="{FF2B5EF4-FFF2-40B4-BE49-F238E27FC236}">
+                <a16:creationId xmlns:a16="http://schemas.microsoft.com/office/drawing/2014/main" id="{32BE4E72-7537-299C-8983-D187F218524C}"/>
+              </a:ext>
+            </a:extLst>
+          </p:cNvPr>
+          <p:cNvSpPr>
+            <a:spLocks noGrp="1"/>
+          </p:cNvSpPr>
+          <p:nvPr>
+            <p:ph type="sldNum" sz="quarter" idx="12"/>
+          </p:nvPr>
+        </p:nvSpPr>
+        <p:spPr/>
+        <p:txBody>
+          <a:bodyPr/>
+          <a:lstStyle/>
+          <a:p>
+            <a:pPr rtl="0"/>
+            <a:fld id="{B5CEABB6-07DC-46E8-9B57-56EC44A396E5}" type="slidenum">
+              <a:rPr lang="pt-PT" noProof="0" smtClean="0"/>
+              <a:pPr rtl="0"/>
+              <a:t>11</a:t>
+            </a:fld>
+            <a:endParaRPr lang="pt-PT" noProof="0"/>
+          </a:p>
+        </p:txBody>
+      </p:sp>
+      <p:pic>
+        <p:nvPicPr>
+          <p:cNvPr id="8" name="Picture 7" descr="A graph with numbers and lines&#10;&#10;AI-generated content may be incorrect.">
+            <a:extLst>
+              <a:ext uri="{FF2B5EF4-FFF2-40B4-BE49-F238E27FC236}">
+                <a16:creationId xmlns:a16="http://schemas.microsoft.com/office/drawing/2014/main" id="{854D4A07-E4A5-8B0A-1FAE-102EFE450B5A}"/>
+              </a:ext>
+            </a:extLst>
+          </p:cNvPr>
+          <p:cNvPicPr>
+            <a:picLocks noChangeAspect="1"/>
+          </p:cNvPicPr>
+          <p:nvPr/>
+        </p:nvPicPr>
+        <p:blipFill>
+          <a:blip r:embed="rId2"/>
+          <a:stretch>
+            <a:fillRect/>
+          </a:stretch>
+        </p:blipFill>
+        <p:spPr>
+          <a:xfrm>
+            <a:off x="996696" y="1476294"/>
+            <a:ext cx="10198608" cy="5062618"/>
+          </a:xfrm>
+          <a:prstGeom prst="rect">
+            <a:avLst/>
+          </a:prstGeom>
+        </p:spPr>
+      </p:pic>
+    </p:spTree>
+    <p:extLst>
+      <p:ext uri="{BB962C8B-B14F-4D97-AF65-F5344CB8AC3E}">
+        <p14:creationId xmlns:p14="http://schemas.microsoft.com/office/powerpoint/2010/main" val="497250946"/>
+      </p:ext>
+    </p:extLst>
+  </p:cSld>
+  <p:clrMapOvr>
+    <a:masterClrMapping/>
+  </p:clrMapOvr>
+</p:sld>
+</file>
+
+<file path=ppt/slides/slide12.xml><?xml version="1.0" encoding="utf-8"?>
+<p:sld xmlns:a="http://schemas.openxmlformats.org/drawingml/2006/main" xmlns:r="http://schemas.openxmlformats.org/officeDocument/2006/relationships" xmlns:p="http://schemas.openxmlformats.org/presentationml/2006/main" show="0">
   <p:cSld>
     <p:spTree>
       <p:nvGrpSpPr>
@@ -9249,7 +9607,7 @@
             <a:fld id="{B5CEABB6-07DC-46E8-9B57-56EC44A396E5}" type="slidenum">
               <a:rPr lang="pt-PT" noProof="0" smtClean="0"/>
               <a:pPr rtl="0"/>
-              <a:t>10</a:t>
+              <a:t>12</a:t>
             </a:fld>
             <a:endParaRPr lang="pt-PT" noProof="0"/>
           </a:p>
@@ -9297,8 +9655,8 @@
 </p:sld>
 </file>
 
-<file path=ppt/slides/slide11.xml><?xml version="1.0" encoding="utf-8"?>
-<p:sld xmlns:a="http://schemas.openxmlformats.org/drawingml/2006/main" xmlns:r="http://schemas.openxmlformats.org/officeDocument/2006/relationships" xmlns:p="http://schemas.openxmlformats.org/presentationml/2006/main">
+<file path=ppt/slides/slide13.xml><?xml version="1.0" encoding="utf-8"?>
+<p:sld xmlns:a="http://schemas.openxmlformats.org/drawingml/2006/main" xmlns:r="http://schemas.openxmlformats.org/officeDocument/2006/relationships" xmlns:p="http://schemas.openxmlformats.org/presentationml/2006/main" show="0">
   <p:cSld>
     <p:spTree>
       <p:nvGrpSpPr>
@@ -9378,7 +9736,7 @@
             <a:fld id="{B5CEABB6-07DC-46E8-9B57-56EC44A396E5}" type="slidenum">
               <a:rPr lang="pt-PT" noProof="0" smtClean="0"/>
               <a:pPr rtl="0"/>
-              <a:t>11</a:t>
+              <a:t>13</a:t>
             </a:fld>
             <a:endParaRPr lang="pt-PT" noProof="0"/>
           </a:p>
@@ -9517,8 +9875,8 @@
 </p:sld>
 </file>
 
-<file path=ppt/slides/slide12.xml><?xml version="1.0" encoding="utf-8"?>
-<p:sld xmlns:a="http://schemas.openxmlformats.org/drawingml/2006/main" xmlns:r="http://schemas.openxmlformats.org/officeDocument/2006/relationships" xmlns:p="http://schemas.openxmlformats.org/presentationml/2006/main">
+<file path=ppt/slides/slide14.xml><?xml version="1.0" encoding="utf-8"?>
+<p:sld xmlns:a="http://schemas.openxmlformats.org/drawingml/2006/main" xmlns:r="http://schemas.openxmlformats.org/officeDocument/2006/relationships" xmlns:p="http://schemas.openxmlformats.org/presentationml/2006/main" show="0">
   <p:cSld>
     <p:spTree>
       <p:nvGrpSpPr>
@@ -9598,7 +9956,7 @@
             <a:fld id="{B5CEABB6-07DC-46E8-9B57-56EC44A396E5}" type="slidenum">
               <a:rPr lang="pt-PT" noProof="0" smtClean="0"/>
               <a:pPr rtl="0"/>
-              <a:t>12</a:t>
+              <a:t>14</a:t>
             </a:fld>
             <a:endParaRPr lang="pt-PT" noProof="0"/>
           </a:p>
@@ -9665,8 +10023,8 @@
 </p:sld>
 </file>
 
-<file path=ppt/slides/slide13.xml><?xml version="1.0" encoding="utf-8"?>
-<p:sld xmlns:a="http://schemas.openxmlformats.org/drawingml/2006/main" xmlns:r="http://schemas.openxmlformats.org/officeDocument/2006/relationships" xmlns:p="http://schemas.openxmlformats.org/presentationml/2006/main">
+<file path=ppt/slides/slide15.xml><?xml version="1.0" encoding="utf-8"?>
+<p:sld xmlns:a="http://schemas.openxmlformats.org/drawingml/2006/main" xmlns:r="http://schemas.openxmlformats.org/officeDocument/2006/relationships" xmlns:p="http://schemas.openxmlformats.org/presentationml/2006/main" show="0">
   <p:cSld>
     <p:spTree>
       <p:nvGrpSpPr>
@@ -9746,7 +10104,7 @@
             <a:fld id="{B5CEABB6-07DC-46E8-9B57-56EC44A396E5}" type="slidenum">
               <a:rPr lang="pt-PT" noProof="0" smtClean="0"/>
               <a:pPr rtl="0"/>
-              <a:t>13</a:t>
+              <a:t>15</a:t>
             </a:fld>
             <a:endParaRPr lang="pt-PT" noProof="0"/>
           </a:p>
@@ -9813,8 +10171,8 @@
 </p:sld>
 </file>
 
-<file path=ppt/slides/slide14.xml><?xml version="1.0" encoding="utf-8"?>
-<p:sld xmlns:a="http://schemas.openxmlformats.org/drawingml/2006/main" xmlns:r="http://schemas.openxmlformats.org/officeDocument/2006/relationships" xmlns:p="http://schemas.openxmlformats.org/presentationml/2006/main">
+<file path=ppt/slides/slide16.xml><?xml version="1.0" encoding="utf-8"?>
+<p:sld xmlns:a="http://schemas.openxmlformats.org/drawingml/2006/main" xmlns:r="http://schemas.openxmlformats.org/officeDocument/2006/relationships" xmlns:p="http://schemas.openxmlformats.org/presentationml/2006/main" show="0">
   <p:cSld>
     <p:spTree>
       <p:nvGrpSpPr>
@@ -9894,7 +10252,7 @@
             <a:fld id="{B5CEABB6-07DC-46E8-9B57-56EC44A396E5}" type="slidenum">
               <a:rPr lang="pt-PT" noProof="0" smtClean="0"/>
               <a:pPr rtl="0"/>
-              <a:t>14</a:t>
+              <a:t>16</a:t>
             </a:fld>
             <a:endParaRPr lang="pt-PT" noProof="0"/>
           </a:p>
@@ -9961,8 +10319,8 @@
 </p:sld>
 </file>
 
-<file path=ppt/slides/slide15.xml><?xml version="1.0" encoding="utf-8"?>
-<p:sld xmlns:a="http://schemas.openxmlformats.org/drawingml/2006/main" xmlns:r="http://schemas.openxmlformats.org/officeDocument/2006/relationships" xmlns:p="http://schemas.openxmlformats.org/presentationml/2006/main">
+<file path=ppt/slides/slide17.xml><?xml version="1.0" encoding="utf-8"?>
+<p:sld xmlns:a="http://schemas.openxmlformats.org/drawingml/2006/main" xmlns:r="http://schemas.openxmlformats.org/officeDocument/2006/relationships" xmlns:p="http://schemas.openxmlformats.org/presentationml/2006/main" show="0">
   <p:cSld>
     <p:spTree>
       <p:nvGrpSpPr>
@@ -10042,7 +10400,7 @@
             <a:fld id="{B5CEABB6-07DC-46E8-9B57-56EC44A396E5}" type="slidenum">
               <a:rPr lang="pt-PT" noProof="0" smtClean="0"/>
               <a:pPr rtl="0"/>
-              <a:t>15</a:t>
+              <a:t>17</a:t>
             </a:fld>
             <a:endParaRPr lang="pt-PT" noProof="0"/>
           </a:p>
@@ -10090,8 +10448,8 @@
 </p:sld>
 </file>
 
-<file path=ppt/slides/slide16.xml><?xml version="1.0" encoding="utf-8"?>
-<p:sld xmlns:a="http://schemas.openxmlformats.org/drawingml/2006/main" xmlns:r="http://schemas.openxmlformats.org/officeDocument/2006/relationships" xmlns:p="http://schemas.openxmlformats.org/presentationml/2006/main">
+<file path=ppt/slides/slide18.xml><?xml version="1.0" encoding="utf-8"?>
+<p:sld xmlns:a="http://schemas.openxmlformats.org/drawingml/2006/main" xmlns:r="http://schemas.openxmlformats.org/officeDocument/2006/relationships" xmlns:p="http://schemas.openxmlformats.org/presentationml/2006/main" show="0">
   <p:cSld>
     <p:spTree>
       <p:nvGrpSpPr>
@@ -10171,7 +10529,7 @@
             <a:fld id="{B5CEABB6-07DC-46E8-9B57-56EC44A396E5}" type="slidenum">
               <a:rPr lang="pt-PT" noProof="0" smtClean="0"/>
               <a:pPr rtl="0"/>
-              <a:t>16</a:t>
+              <a:t>18</a:t>
             </a:fld>
             <a:endParaRPr lang="pt-PT" noProof="0"/>
           </a:p>
@@ -10219,8 +10577,8 @@
 </p:sld>
 </file>
 
-<file path=ppt/slides/slide17.xml><?xml version="1.0" encoding="utf-8"?>
-<p:sld xmlns:a="http://schemas.openxmlformats.org/drawingml/2006/main" xmlns:r="http://schemas.openxmlformats.org/officeDocument/2006/relationships" xmlns:p="http://schemas.openxmlformats.org/presentationml/2006/main">
+<file path=ppt/slides/slide19.xml><?xml version="1.0" encoding="utf-8"?>
+<p:sld xmlns:a="http://schemas.openxmlformats.org/drawingml/2006/main" xmlns:r="http://schemas.openxmlformats.org/officeDocument/2006/relationships" xmlns:p="http://schemas.openxmlformats.org/presentationml/2006/main" show="0">
   <p:cSld>
     <p:spTree>
       <p:nvGrpSpPr>
@@ -10300,7 +10658,7 @@
             <a:fld id="{B5CEABB6-07DC-46E8-9B57-56EC44A396E5}" type="slidenum">
               <a:rPr lang="pt-PT" noProof="0" smtClean="0"/>
               <a:pPr rtl="0"/>
-              <a:t>17</a:t>
+              <a:t>19</a:t>
             </a:fld>
             <a:endParaRPr lang="pt-PT" noProof="0"/>
           </a:p>
@@ -10430,264 +10788,6 @@
     <p:extLst>
       <p:ext uri="{BB962C8B-B14F-4D97-AF65-F5344CB8AC3E}">
         <p14:creationId xmlns:p14="http://schemas.microsoft.com/office/powerpoint/2010/main" val="279734992"/>
-      </p:ext>
-    </p:extLst>
-  </p:cSld>
-  <p:clrMapOvr>
-    <a:masterClrMapping/>
-  </p:clrMapOvr>
-</p:sld>
-</file>
-
-<file path=ppt/slides/slide18.xml><?xml version="1.0" encoding="utf-8"?>
-<p:sld xmlns:a="http://schemas.openxmlformats.org/drawingml/2006/main" xmlns:r="http://schemas.openxmlformats.org/officeDocument/2006/relationships" xmlns:p="http://schemas.openxmlformats.org/presentationml/2006/main">
-  <p:cSld>
-    <p:spTree>
-      <p:nvGrpSpPr>
-        <p:cNvPr id="1" name="">
-          <a:extLst>
-            <a:ext uri="{FF2B5EF4-FFF2-40B4-BE49-F238E27FC236}">
-              <a16:creationId xmlns:a16="http://schemas.microsoft.com/office/drawing/2014/main" id="{F7EB346C-469F-4742-8070-C08D32E84EBD}"/>
-            </a:ext>
-          </a:extLst>
-        </p:cNvPr>
-        <p:cNvGrpSpPr/>
-        <p:nvPr/>
-      </p:nvGrpSpPr>
-      <p:grpSpPr>
-        <a:xfrm>
-          <a:off x="0" y="0"/>
-          <a:ext cx="0" cy="0"/>
-          <a:chOff x="0" y="0"/>
-          <a:chExt cx="0" cy="0"/>
-        </a:xfrm>
-      </p:grpSpPr>
-      <p:sp>
-        <p:nvSpPr>
-          <p:cNvPr id="2" name="Title 1">
-            <a:extLst>
-              <a:ext uri="{FF2B5EF4-FFF2-40B4-BE49-F238E27FC236}">
-                <a16:creationId xmlns:a16="http://schemas.microsoft.com/office/drawing/2014/main" id="{A824109E-C0AE-D28C-B39F-B42EB830E7AB}"/>
-              </a:ext>
-            </a:extLst>
-          </p:cNvPr>
-          <p:cNvSpPr>
-            <a:spLocks noGrp="1"/>
-          </p:cNvSpPr>
-          <p:nvPr>
-            <p:ph type="title"/>
-          </p:nvPr>
-        </p:nvSpPr>
-        <p:spPr>
-          <a:xfrm>
-            <a:off x="3253740" y="259589"/>
-            <a:ext cx="5684520" cy="821815"/>
-          </a:xfrm>
-        </p:spPr>
-        <p:txBody>
-          <a:bodyPr/>
-          <a:lstStyle/>
-          <a:p>
-            <a:r>
-              <a:rPr lang="pt-PT" dirty="0"/>
-              <a:t>Time Series PM10</a:t>
-            </a:r>
-          </a:p>
-        </p:txBody>
-      </p:sp>
-      <p:sp>
-        <p:nvSpPr>
-          <p:cNvPr id="6" name="Slide Number Placeholder 5">
-            <a:extLst>
-              <a:ext uri="{FF2B5EF4-FFF2-40B4-BE49-F238E27FC236}">
-                <a16:creationId xmlns:a16="http://schemas.microsoft.com/office/drawing/2014/main" id="{85DFAB98-696B-B082-4BEA-96C91507C345}"/>
-              </a:ext>
-            </a:extLst>
-          </p:cNvPr>
-          <p:cNvSpPr>
-            <a:spLocks noGrp="1"/>
-          </p:cNvSpPr>
-          <p:nvPr>
-            <p:ph type="sldNum" sz="quarter" idx="12"/>
-          </p:nvPr>
-        </p:nvSpPr>
-        <p:spPr/>
-        <p:txBody>
-          <a:bodyPr/>
-          <a:lstStyle/>
-          <a:p>
-            <a:pPr rtl="0"/>
-            <a:fld id="{B5CEABB6-07DC-46E8-9B57-56EC44A396E5}" type="slidenum">
-              <a:rPr lang="pt-PT" noProof="0" smtClean="0"/>
-              <a:pPr rtl="0"/>
-              <a:t>18</a:t>
-            </a:fld>
-            <a:endParaRPr lang="pt-PT" noProof="0"/>
-          </a:p>
-        </p:txBody>
-      </p:sp>
-      <p:pic>
-        <p:nvPicPr>
-          <p:cNvPr id="8" name="Content Placeholder 7" descr="A graph of a number of data&#10;&#10;AI-generated content may be incorrect.">
-            <a:extLst>
-              <a:ext uri="{FF2B5EF4-FFF2-40B4-BE49-F238E27FC236}">
-                <a16:creationId xmlns:a16="http://schemas.microsoft.com/office/drawing/2014/main" id="{F1A06DCC-CDC1-9BBB-4A74-92FD5BBE4C9E}"/>
-              </a:ext>
-            </a:extLst>
-          </p:cNvPr>
-          <p:cNvPicPr>
-            <a:picLocks noGrp="1" noChangeAspect="1"/>
-          </p:cNvPicPr>
-          <p:nvPr>
-            <p:ph idx="1"/>
-          </p:nvPr>
-        </p:nvPicPr>
-        <p:blipFill>
-          <a:blip r:embed="rId2"/>
-          <a:stretch>
-            <a:fillRect/>
-          </a:stretch>
-        </p:blipFill>
-        <p:spPr>
-          <a:xfrm>
-            <a:off x="1232341" y="1407539"/>
-            <a:ext cx="9727317" cy="4828669"/>
-          </a:xfrm>
-        </p:spPr>
-      </p:pic>
-    </p:spTree>
-    <p:extLst>
-      <p:ext uri="{BB962C8B-B14F-4D97-AF65-F5344CB8AC3E}">
-        <p14:creationId xmlns:p14="http://schemas.microsoft.com/office/powerpoint/2010/main" val="4059378615"/>
-      </p:ext>
-    </p:extLst>
-  </p:cSld>
-  <p:clrMapOvr>
-    <a:masterClrMapping/>
-  </p:clrMapOvr>
-</p:sld>
-</file>
-
-<file path=ppt/slides/slide19.xml><?xml version="1.0" encoding="utf-8"?>
-<p:sld xmlns:a="http://schemas.openxmlformats.org/drawingml/2006/main" xmlns:r="http://schemas.openxmlformats.org/officeDocument/2006/relationships" xmlns:p="http://schemas.openxmlformats.org/presentationml/2006/main">
-  <p:cSld>
-    <p:spTree>
-      <p:nvGrpSpPr>
-        <p:cNvPr id="1" name="">
-          <a:extLst>
-            <a:ext uri="{FF2B5EF4-FFF2-40B4-BE49-F238E27FC236}">
-              <a16:creationId xmlns:a16="http://schemas.microsoft.com/office/drawing/2014/main" id="{544EE46A-4430-14B1-D5EF-F38B4B58858F}"/>
-            </a:ext>
-          </a:extLst>
-        </p:cNvPr>
-        <p:cNvGrpSpPr/>
-        <p:nvPr/>
-      </p:nvGrpSpPr>
-      <p:grpSpPr>
-        <a:xfrm>
-          <a:off x="0" y="0"/>
-          <a:ext cx="0" cy="0"/>
-          <a:chOff x="0" y="0"/>
-          <a:chExt cx="0" cy="0"/>
-        </a:xfrm>
-      </p:grpSpPr>
-      <p:sp>
-        <p:nvSpPr>
-          <p:cNvPr id="2" name="Title 1">
-            <a:extLst>
-              <a:ext uri="{FF2B5EF4-FFF2-40B4-BE49-F238E27FC236}">
-                <a16:creationId xmlns:a16="http://schemas.microsoft.com/office/drawing/2014/main" id="{65EBA386-6F73-532E-5583-CD4E71F3FBC9}"/>
-              </a:ext>
-            </a:extLst>
-          </p:cNvPr>
-          <p:cNvSpPr>
-            <a:spLocks noGrp="1"/>
-          </p:cNvSpPr>
-          <p:nvPr>
-            <p:ph type="title"/>
-          </p:nvPr>
-        </p:nvSpPr>
-        <p:spPr>
-          <a:xfrm>
-            <a:off x="3253740" y="259589"/>
-            <a:ext cx="5684520" cy="821815"/>
-          </a:xfrm>
-        </p:spPr>
-        <p:txBody>
-          <a:bodyPr/>
-          <a:lstStyle/>
-          <a:p>
-            <a:r>
-              <a:rPr lang="pt-PT" dirty="0"/>
-              <a:t>Variabilidade PM10</a:t>
-            </a:r>
-          </a:p>
-        </p:txBody>
-      </p:sp>
-      <p:sp>
-        <p:nvSpPr>
-          <p:cNvPr id="6" name="Slide Number Placeholder 5">
-            <a:extLst>
-              <a:ext uri="{FF2B5EF4-FFF2-40B4-BE49-F238E27FC236}">
-                <a16:creationId xmlns:a16="http://schemas.microsoft.com/office/drawing/2014/main" id="{A692E3EE-8CEE-248F-274C-7325438913E7}"/>
-              </a:ext>
-            </a:extLst>
-          </p:cNvPr>
-          <p:cNvSpPr>
-            <a:spLocks noGrp="1"/>
-          </p:cNvSpPr>
-          <p:nvPr>
-            <p:ph type="sldNum" sz="quarter" idx="12"/>
-          </p:nvPr>
-        </p:nvSpPr>
-        <p:spPr/>
-        <p:txBody>
-          <a:bodyPr/>
-          <a:lstStyle/>
-          <a:p>
-            <a:pPr rtl="0"/>
-            <a:fld id="{B5CEABB6-07DC-46E8-9B57-56EC44A396E5}" type="slidenum">
-              <a:rPr lang="pt-PT" noProof="0" smtClean="0"/>
-              <a:pPr rtl="0"/>
-              <a:t>19</a:t>
-            </a:fld>
-            <a:endParaRPr lang="pt-PT" noProof="0"/>
-          </a:p>
-        </p:txBody>
-      </p:sp>
-      <p:pic>
-        <p:nvPicPr>
-          <p:cNvPr id="7" name="Content Placeholder 6" descr="A graph of blue squares&#10;&#10;AI-generated content may be incorrect.">
-            <a:extLst>
-              <a:ext uri="{FF2B5EF4-FFF2-40B4-BE49-F238E27FC236}">
-                <a16:creationId xmlns:a16="http://schemas.microsoft.com/office/drawing/2014/main" id="{7B22FD0F-D69A-8B5E-4849-0540CDE58445}"/>
-              </a:ext>
-            </a:extLst>
-          </p:cNvPr>
-          <p:cNvPicPr>
-            <a:picLocks noGrp="1" noChangeAspect="1"/>
-          </p:cNvPicPr>
-          <p:nvPr>
-            <p:ph idx="1"/>
-          </p:nvPr>
-        </p:nvPicPr>
-        <p:blipFill>
-          <a:blip r:embed="rId2"/>
-          <a:stretch>
-            <a:fillRect/>
-          </a:stretch>
-        </p:blipFill>
-        <p:spPr>
-          <a:xfrm>
-            <a:off x="1470702" y="1572768"/>
-            <a:ext cx="9250596" cy="4590288"/>
-          </a:xfrm>
-        </p:spPr>
-      </p:pic>
-    </p:spTree>
-    <p:extLst>
-      <p:ext uri="{BB962C8B-B14F-4D97-AF65-F5344CB8AC3E}">
-        <p14:creationId xmlns:p14="http://schemas.microsoft.com/office/powerpoint/2010/main" val="4271150324"/>
       </p:ext>
     </p:extLst>
   </p:cSld>
@@ -10742,17 +10842,12 @@
           <a:p>
             <a:r>
               <a:rPr lang="pt-PT" dirty="0" err="1"/>
-              <a:t>Study</a:t>
+              <a:t>Raw</a:t>
             </a:r>
             <a:r>
               <a:rPr lang="pt-PT" dirty="0"/>
-              <a:t> </a:t>
-            </a:r>
-            <a:r>
-              <a:rPr lang="pt-PT" dirty="0" err="1"/>
-              <a:t>Area</a:t>
-            </a:r>
-            <a:endParaRPr lang="pt-PT" dirty="0"/>
+              <a:t> Data</a:t>
+            </a:r>
           </a:p>
         </p:txBody>
       </p:sp>
@@ -10789,10 +10884,10 @@
       </p:sp>
       <p:pic>
         <p:nvPicPr>
-          <p:cNvPr id="7" name="Content Placeholder 6" descr="A map of europe with different colored squares&#10;&#10;AI-generated content may be incorrect.">
-            <a:extLst>
-              <a:ext uri="{FF2B5EF4-FFF2-40B4-BE49-F238E27FC236}">
-                <a16:creationId xmlns:a16="http://schemas.microsoft.com/office/drawing/2014/main" id="{F5EA2F16-5767-3B46-6E59-5560C61DDE9D}"/>
+          <p:cNvPr id="12" name="Content Placeholder 11" descr="A map of europe with green and orange spots&#10;&#10;AI-generated content may be incorrect.">
+            <a:extLst>
+              <a:ext uri="{FF2B5EF4-FFF2-40B4-BE49-F238E27FC236}">
+                <a16:creationId xmlns:a16="http://schemas.microsoft.com/office/drawing/2014/main" id="{422826A5-ACA4-4C5A-CFD9-4CA64B6D24DE}"/>
               </a:ext>
             </a:extLst>
           </p:cNvPr>
@@ -10811,8 +10906,8 @@
         </p:blipFill>
         <p:spPr>
           <a:xfrm>
-            <a:off x="2368377" y="1359082"/>
-            <a:ext cx="7455246" cy="5239329"/>
+            <a:off x="2510986" y="1289309"/>
+            <a:ext cx="7170027" cy="5249603"/>
           </a:xfrm>
         </p:spPr>
       </p:pic>
@@ -10830,7 +10925,265 @@
 </file>
 
 <file path=ppt/slides/slide20.xml><?xml version="1.0" encoding="utf-8"?>
-<p:sld xmlns:a="http://schemas.openxmlformats.org/drawingml/2006/main" xmlns:r="http://schemas.openxmlformats.org/officeDocument/2006/relationships" xmlns:p="http://schemas.openxmlformats.org/presentationml/2006/main">
+<p:sld xmlns:a="http://schemas.openxmlformats.org/drawingml/2006/main" xmlns:r="http://schemas.openxmlformats.org/officeDocument/2006/relationships" xmlns:p="http://schemas.openxmlformats.org/presentationml/2006/main" show="0">
+  <p:cSld>
+    <p:spTree>
+      <p:nvGrpSpPr>
+        <p:cNvPr id="1" name="">
+          <a:extLst>
+            <a:ext uri="{FF2B5EF4-FFF2-40B4-BE49-F238E27FC236}">
+              <a16:creationId xmlns:a16="http://schemas.microsoft.com/office/drawing/2014/main" id="{F7EB346C-469F-4742-8070-C08D32E84EBD}"/>
+            </a:ext>
+          </a:extLst>
+        </p:cNvPr>
+        <p:cNvGrpSpPr/>
+        <p:nvPr/>
+      </p:nvGrpSpPr>
+      <p:grpSpPr>
+        <a:xfrm>
+          <a:off x="0" y="0"/>
+          <a:ext cx="0" cy="0"/>
+          <a:chOff x="0" y="0"/>
+          <a:chExt cx="0" cy="0"/>
+        </a:xfrm>
+      </p:grpSpPr>
+      <p:sp>
+        <p:nvSpPr>
+          <p:cNvPr id="2" name="Title 1">
+            <a:extLst>
+              <a:ext uri="{FF2B5EF4-FFF2-40B4-BE49-F238E27FC236}">
+                <a16:creationId xmlns:a16="http://schemas.microsoft.com/office/drawing/2014/main" id="{A824109E-C0AE-D28C-B39F-B42EB830E7AB}"/>
+              </a:ext>
+            </a:extLst>
+          </p:cNvPr>
+          <p:cNvSpPr>
+            <a:spLocks noGrp="1"/>
+          </p:cNvSpPr>
+          <p:nvPr>
+            <p:ph type="title"/>
+          </p:nvPr>
+        </p:nvSpPr>
+        <p:spPr>
+          <a:xfrm>
+            <a:off x="3253740" y="259589"/>
+            <a:ext cx="5684520" cy="821815"/>
+          </a:xfrm>
+        </p:spPr>
+        <p:txBody>
+          <a:bodyPr/>
+          <a:lstStyle/>
+          <a:p>
+            <a:r>
+              <a:rPr lang="pt-PT" dirty="0"/>
+              <a:t>Time Series PM10</a:t>
+            </a:r>
+          </a:p>
+        </p:txBody>
+      </p:sp>
+      <p:sp>
+        <p:nvSpPr>
+          <p:cNvPr id="6" name="Slide Number Placeholder 5">
+            <a:extLst>
+              <a:ext uri="{FF2B5EF4-FFF2-40B4-BE49-F238E27FC236}">
+                <a16:creationId xmlns:a16="http://schemas.microsoft.com/office/drawing/2014/main" id="{85DFAB98-696B-B082-4BEA-96C91507C345}"/>
+              </a:ext>
+            </a:extLst>
+          </p:cNvPr>
+          <p:cNvSpPr>
+            <a:spLocks noGrp="1"/>
+          </p:cNvSpPr>
+          <p:nvPr>
+            <p:ph type="sldNum" sz="quarter" idx="12"/>
+          </p:nvPr>
+        </p:nvSpPr>
+        <p:spPr/>
+        <p:txBody>
+          <a:bodyPr/>
+          <a:lstStyle/>
+          <a:p>
+            <a:pPr rtl="0"/>
+            <a:fld id="{B5CEABB6-07DC-46E8-9B57-56EC44A396E5}" type="slidenum">
+              <a:rPr lang="pt-PT" noProof="0" smtClean="0"/>
+              <a:pPr rtl="0"/>
+              <a:t>20</a:t>
+            </a:fld>
+            <a:endParaRPr lang="pt-PT" noProof="0"/>
+          </a:p>
+        </p:txBody>
+      </p:sp>
+      <p:pic>
+        <p:nvPicPr>
+          <p:cNvPr id="8" name="Content Placeholder 7" descr="A graph of a number of data&#10;&#10;AI-generated content may be incorrect.">
+            <a:extLst>
+              <a:ext uri="{FF2B5EF4-FFF2-40B4-BE49-F238E27FC236}">
+                <a16:creationId xmlns:a16="http://schemas.microsoft.com/office/drawing/2014/main" id="{F1A06DCC-CDC1-9BBB-4A74-92FD5BBE4C9E}"/>
+              </a:ext>
+            </a:extLst>
+          </p:cNvPr>
+          <p:cNvPicPr>
+            <a:picLocks noGrp="1" noChangeAspect="1"/>
+          </p:cNvPicPr>
+          <p:nvPr>
+            <p:ph idx="1"/>
+          </p:nvPr>
+        </p:nvPicPr>
+        <p:blipFill>
+          <a:blip r:embed="rId2"/>
+          <a:stretch>
+            <a:fillRect/>
+          </a:stretch>
+        </p:blipFill>
+        <p:spPr>
+          <a:xfrm>
+            <a:off x="1232341" y="1407539"/>
+            <a:ext cx="9727317" cy="4828669"/>
+          </a:xfrm>
+        </p:spPr>
+      </p:pic>
+    </p:spTree>
+    <p:extLst>
+      <p:ext uri="{BB962C8B-B14F-4D97-AF65-F5344CB8AC3E}">
+        <p14:creationId xmlns:p14="http://schemas.microsoft.com/office/powerpoint/2010/main" val="4059378615"/>
+      </p:ext>
+    </p:extLst>
+  </p:cSld>
+  <p:clrMapOvr>
+    <a:masterClrMapping/>
+  </p:clrMapOvr>
+</p:sld>
+</file>
+
+<file path=ppt/slides/slide21.xml><?xml version="1.0" encoding="utf-8"?>
+<p:sld xmlns:a="http://schemas.openxmlformats.org/drawingml/2006/main" xmlns:r="http://schemas.openxmlformats.org/officeDocument/2006/relationships" xmlns:p="http://schemas.openxmlformats.org/presentationml/2006/main" show="0">
+  <p:cSld>
+    <p:spTree>
+      <p:nvGrpSpPr>
+        <p:cNvPr id="1" name="">
+          <a:extLst>
+            <a:ext uri="{FF2B5EF4-FFF2-40B4-BE49-F238E27FC236}">
+              <a16:creationId xmlns:a16="http://schemas.microsoft.com/office/drawing/2014/main" id="{544EE46A-4430-14B1-D5EF-F38B4B58858F}"/>
+            </a:ext>
+          </a:extLst>
+        </p:cNvPr>
+        <p:cNvGrpSpPr/>
+        <p:nvPr/>
+      </p:nvGrpSpPr>
+      <p:grpSpPr>
+        <a:xfrm>
+          <a:off x="0" y="0"/>
+          <a:ext cx="0" cy="0"/>
+          <a:chOff x="0" y="0"/>
+          <a:chExt cx="0" cy="0"/>
+        </a:xfrm>
+      </p:grpSpPr>
+      <p:sp>
+        <p:nvSpPr>
+          <p:cNvPr id="2" name="Title 1">
+            <a:extLst>
+              <a:ext uri="{FF2B5EF4-FFF2-40B4-BE49-F238E27FC236}">
+                <a16:creationId xmlns:a16="http://schemas.microsoft.com/office/drawing/2014/main" id="{65EBA386-6F73-532E-5583-CD4E71F3FBC9}"/>
+              </a:ext>
+            </a:extLst>
+          </p:cNvPr>
+          <p:cNvSpPr>
+            <a:spLocks noGrp="1"/>
+          </p:cNvSpPr>
+          <p:nvPr>
+            <p:ph type="title"/>
+          </p:nvPr>
+        </p:nvSpPr>
+        <p:spPr>
+          <a:xfrm>
+            <a:off x="3253740" y="259589"/>
+            <a:ext cx="5684520" cy="821815"/>
+          </a:xfrm>
+        </p:spPr>
+        <p:txBody>
+          <a:bodyPr/>
+          <a:lstStyle/>
+          <a:p>
+            <a:r>
+              <a:rPr lang="pt-PT" dirty="0"/>
+              <a:t>Variabilidade PM10</a:t>
+            </a:r>
+          </a:p>
+        </p:txBody>
+      </p:sp>
+      <p:sp>
+        <p:nvSpPr>
+          <p:cNvPr id="6" name="Slide Number Placeholder 5">
+            <a:extLst>
+              <a:ext uri="{FF2B5EF4-FFF2-40B4-BE49-F238E27FC236}">
+                <a16:creationId xmlns:a16="http://schemas.microsoft.com/office/drawing/2014/main" id="{A692E3EE-8CEE-248F-274C-7325438913E7}"/>
+              </a:ext>
+            </a:extLst>
+          </p:cNvPr>
+          <p:cNvSpPr>
+            <a:spLocks noGrp="1"/>
+          </p:cNvSpPr>
+          <p:nvPr>
+            <p:ph type="sldNum" sz="quarter" idx="12"/>
+          </p:nvPr>
+        </p:nvSpPr>
+        <p:spPr/>
+        <p:txBody>
+          <a:bodyPr/>
+          <a:lstStyle/>
+          <a:p>
+            <a:pPr rtl="0"/>
+            <a:fld id="{B5CEABB6-07DC-46E8-9B57-56EC44A396E5}" type="slidenum">
+              <a:rPr lang="pt-PT" noProof="0" smtClean="0"/>
+              <a:pPr rtl="0"/>
+              <a:t>21</a:t>
+            </a:fld>
+            <a:endParaRPr lang="pt-PT" noProof="0"/>
+          </a:p>
+        </p:txBody>
+      </p:sp>
+      <p:pic>
+        <p:nvPicPr>
+          <p:cNvPr id="7" name="Content Placeholder 6" descr="A graph of blue squares&#10;&#10;AI-generated content may be incorrect.">
+            <a:extLst>
+              <a:ext uri="{FF2B5EF4-FFF2-40B4-BE49-F238E27FC236}">
+                <a16:creationId xmlns:a16="http://schemas.microsoft.com/office/drawing/2014/main" id="{7B22FD0F-D69A-8B5E-4849-0540CDE58445}"/>
+              </a:ext>
+            </a:extLst>
+          </p:cNvPr>
+          <p:cNvPicPr>
+            <a:picLocks noGrp="1" noChangeAspect="1"/>
+          </p:cNvPicPr>
+          <p:nvPr>
+            <p:ph idx="1"/>
+          </p:nvPr>
+        </p:nvPicPr>
+        <p:blipFill>
+          <a:blip r:embed="rId2"/>
+          <a:stretch>
+            <a:fillRect/>
+          </a:stretch>
+        </p:blipFill>
+        <p:spPr>
+          <a:xfrm>
+            <a:off x="1470702" y="1572768"/>
+            <a:ext cx="9250596" cy="4590288"/>
+          </a:xfrm>
+        </p:spPr>
+      </p:pic>
+    </p:spTree>
+    <p:extLst>
+      <p:ext uri="{BB962C8B-B14F-4D97-AF65-F5344CB8AC3E}">
+        <p14:creationId xmlns:p14="http://schemas.microsoft.com/office/powerpoint/2010/main" val="4271150324"/>
+      </p:ext>
+    </p:extLst>
+  </p:cSld>
+  <p:clrMapOvr>
+    <a:masterClrMapping/>
+  </p:clrMapOvr>
+</p:sld>
+</file>
+
+<file path=ppt/slides/slide22.xml><?xml version="1.0" encoding="utf-8"?>
+<p:sld xmlns:a="http://schemas.openxmlformats.org/drawingml/2006/main" xmlns:r="http://schemas.openxmlformats.org/officeDocument/2006/relationships" xmlns:p="http://schemas.openxmlformats.org/presentationml/2006/main" show="0">
   <p:cSld>
     <p:spTree>
       <p:nvGrpSpPr>
@@ -10910,7 +11263,7 @@
             <a:fld id="{B5CEABB6-07DC-46E8-9B57-56EC44A396E5}" type="slidenum">
               <a:rPr lang="pt-PT" noProof="0" smtClean="0"/>
               <a:pPr rtl="0"/>
-              <a:t>20</a:t>
+              <a:t>22</a:t>
             </a:fld>
             <a:endParaRPr lang="pt-PT" noProof="0"/>
           </a:p>
@@ -11048,8 +11401,8 @@
 </p:sld>
 </file>
 
-<file path=ppt/slides/slide21.xml><?xml version="1.0" encoding="utf-8"?>
-<p:sld xmlns:a="http://schemas.openxmlformats.org/drawingml/2006/main" xmlns:r="http://schemas.openxmlformats.org/officeDocument/2006/relationships" xmlns:p="http://schemas.openxmlformats.org/presentationml/2006/main">
+<file path=ppt/slides/slide23.xml><?xml version="1.0" encoding="utf-8"?>
+<p:sld xmlns:a="http://schemas.openxmlformats.org/drawingml/2006/main" xmlns:r="http://schemas.openxmlformats.org/officeDocument/2006/relationships" xmlns:p="http://schemas.openxmlformats.org/presentationml/2006/main" show="0">
   <p:cSld>
     <p:spTree>
       <p:nvGrpSpPr>
@@ -11129,7 +11482,7 @@
             <a:fld id="{B5CEABB6-07DC-46E8-9B57-56EC44A396E5}" type="slidenum">
               <a:rPr lang="pt-PT" noProof="0" smtClean="0"/>
               <a:pPr rtl="0"/>
-              <a:t>21</a:t>
+              <a:t>23</a:t>
             </a:fld>
             <a:endParaRPr lang="pt-PT" noProof="0"/>
           </a:p>
@@ -11207,7 +11560,7 @@
 </p:sld>
 </file>
 
-<file path=ppt/slides/slide22.xml><?xml version="1.0" encoding="utf-8"?>
+<file path=ppt/slides/slide24.xml><?xml version="1.0" encoding="utf-8"?>
 <p:sld xmlns:a="http://schemas.openxmlformats.org/drawingml/2006/main" xmlns:r="http://schemas.openxmlformats.org/officeDocument/2006/relationships" xmlns:p="http://schemas.openxmlformats.org/presentationml/2006/main">
   <p:cSld>
     <p:spTree>
@@ -11248,18 +11601,37 @@
         </p:nvSpPr>
         <p:spPr>
           <a:xfrm>
-            <a:off x="3253740" y="259589"/>
-            <a:ext cx="5684520" cy="821815"/>
-          </a:xfrm>
-        </p:spPr>
-        <p:txBody>
-          <a:bodyPr/>
+            <a:off x="2244491" y="232777"/>
+            <a:ext cx="7703018" cy="821815"/>
+          </a:xfrm>
+        </p:spPr>
+        <p:txBody>
+          <a:bodyPr>
+            <a:normAutofit/>
+          </a:bodyPr>
           <a:lstStyle/>
           <a:p>
             <a:r>
+              <a:rPr lang="pt-PT" dirty="0" err="1"/>
+              <a:t>Transformation</a:t>
+            </a:r>
+            <a:r>
               <a:rPr lang="pt-PT" dirty="0"/>
-              <a:t>Time Series FRP</a:t>
-            </a:r>
+              <a:t> </a:t>
+            </a:r>
+            <a:r>
+              <a:rPr lang="pt-PT" dirty="0" err="1"/>
+              <a:t>Point</a:t>
+            </a:r>
+            <a:r>
+              <a:rPr lang="pt-PT" dirty="0"/>
+              <a:t> to </a:t>
+            </a:r>
+            <a:r>
+              <a:rPr lang="pt-PT" dirty="0" err="1"/>
+              <a:t>Grid</a:t>
+            </a:r>
+            <a:endParaRPr lang="pt-PT" dirty="0"/>
           </a:p>
         </p:txBody>
       </p:sp>
@@ -11288,7 +11660,7 @@
             <a:fld id="{B5CEABB6-07DC-46E8-9B57-56EC44A396E5}" type="slidenum">
               <a:rPr lang="pt-PT" noProof="0" smtClean="0"/>
               <a:pPr rtl="0"/>
-              <a:t>22</a:t>
+              <a:t>24</a:t>
             </a:fld>
             <a:endParaRPr lang="pt-PT" noProof="0"/>
           </a:p>
@@ -11296,10 +11668,10 @@
       </p:sp>
       <p:pic>
         <p:nvPicPr>
-          <p:cNvPr id="4" name="Picture 3" descr="A graph of a graph&#10;&#10;AI-generated content may be incorrect.">
-            <a:extLst>
-              <a:ext uri="{FF2B5EF4-FFF2-40B4-BE49-F238E27FC236}">
-                <a16:creationId xmlns:a16="http://schemas.microsoft.com/office/drawing/2014/main" id="{CDDC4D67-F685-F524-FE42-1A16064602B0}"/>
+          <p:cNvPr id="8" name="Picture 7" descr="A map of europe with red and white lines&#10;&#10;AI-generated content may be incorrect.">
+            <a:extLst>
+              <a:ext uri="{FF2B5EF4-FFF2-40B4-BE49-F238E27FC236}">
+                <a16:creationId xmlns:a16="http://schemas.microsoft.com/office/drawing/2014/main" id="{6C46C2D7-E263-0FB5-3271-0EE05256A83C}"/>
               </a:ext>
             </a:extLst>
           </p:cNvPr>
@@ -11316,8 +11688,8 @@
         </p:blipFill>
         <p:spPr>
           <a:xfrm>
-            <a:off x="627888" y="1184017"/>
-            <a:ext cx="10936224" cy="5432682"/>
+            <a:off x="2570460" y="1224480"/>
+            <a:ext cx="7051080" cy="5633520"/>
           </a:xfrm>
           <a:prstGeom prst="rect">
             <a:avLst/>
@@ -11337,7 +11709,264 @@
 </p:sld>
 </file>
 
-<file path=ppt/slides/slide23.xml><?xml version="1.0" encoding="utf-8"?>
+<file path=ppt/slides/slide25.xml><?xml version="1.0" encoding="utf-8"?>
+<p:sld xmlns:a="http://schemas.openxmlformats.org/drawingml/2006/main" xmlns:r="http://schemas.openxmlformats.org/officeDocument/2006/relationships" xmlns:p="http://schemas.openxmlformats.org/presentationml/2006/main">
+  <p:cSld>
+    <p:spTree>
+      <p:nvGrpSpPr>
+        <p:cNvPr id="1" name="">
+          <a:extLst>
+            <a:ext uri="{FF2B5EF4-FFF2-40B4-BE49-F238E27FC236}">
+              <a16:creationId xmlns:a16="http://schemas.microsoft.com/office/drawing/2014/main" id="{F085FBF4-FAEB-E73B-50D3-9733584DF992}"/>
+            </a:ext>
+          </a:extLst>
+        </p:cNvPr>
+        <p:cNvGrpSpPr/>
+        <p:nvPr/>
+      </p:nvGrpSpPr>
+      <p:grpSpPr>
+        <a:xfrm>
+          <a:off x="0" y="0"/>
+          <a:ext cx="0" cy="0"/>
+          <a:chOff x="0" y="0"/>
+          <a:chExt cx="0" cy="0"/>
+        </a:xfrm>
+      </p:grpSpPr>
+      <p:sp>
+        <p:nvSpPr>
+          <p:cNvPr id="2" name="Title 1">
+            <a:extLst>
+              <a:ext uri="{FF2B5EF4-FFF2-40B4-BE49-F238E27FC236}">
+                <a16:creationId xmlns:a16="http://schemas.microsoft.com/office/drawing/2014/main" id="{0D80B5A1-2B2C-046E-CAD1-0221DE949CF8}"/>
+              </a:ext>
+            </a:extLst>
+          </p:cNvPr>
+          <p:cNvSpPr>
+            <a:spLocks noGrp="1"/>
+          </p:cNvSpPr>
+          <p:nvPr>
+            <p:ph type="title"/>
+          </p:nvPr>
+        </p:nvSpPr>
+        <p:spPr>
+          <a:xfrm>
+            <a:off x="3253740" y="259589"/>
+            <a:ext cx="5684520" cy="821815"/>
+          </a:xfrm>
+        </p:spPr>
+        <p:txBody>
+          <a:bodyPr/>
+          <a:lstStyle/>
+          <a:p>
+            <a:r>
+              <a:rPr lang="pt-PT" dirty="0"/>
+              <a:t>Time Series FRP</a:t>
+            </a:r>
+          </a:p>
+        </p:txBody>
+      </p:sp>
+      <p:sp>
+        <p:nvSpPr>
+          <p:cNvPr id="6" name="Slide Number Placeholder 5">
+            <a:extLst>
+              <a:ext uri="{FF2B5EF4-FFF2-40B4-BE49-F238E27FC236}">
+                <a16:creationId xmlns:a16="http://schemas.microsoft.com/office/drawing/2014/main" id="{6950E3B7-CA38-515E-0818-8CF874C96110}"/>
+              </a:ext>
+            </a:extLst>
+          </p:cNvPr>
+          <p:cNvSpPr>
+            <a:spLocks noGrp="1"/>
+          </p:cNvSpPr>
+          <p:nvPr>
+            <p:ph type="sldNum" sz="quarter" idx="12"/>
+          </p:nvPr>
+        </p:nvSpPr>
+        <p:spPr/>
+        <p:txBody>
+          <a:bodyPr/>
+          <a:lstStyle/>
+          <a:p>
+            <a:pPr rtl="0"/>
+            <a:fld id="{B5CEABB6-07DC-46E8-9B57-56EC44A396E5}" type="slidenum">
+              <a:rPr lang="pt-PT" noProof="0" smtClean="0"/>
+              <a:pPr rtl="0"/>
+              <a:t>25</a:t>
+            </a:fld>
+            <a:endParaRPr lang="pt-PT" noProof="0"/>
+          </a:p>
+        </p:txBody>
+      </p:sp>
+      <p:pic>
+        <p:nvPicPr>
+          <p:cNvPr id="5" name="Picture 4" descr="A graph of a graph&#10;&#10;AI-generated content may be incorrect.">
+            <a:extLst>
+              <a:ext uri="{FF2B5EF4-FFF2-40B4-BE49-F238E27FC236}">
+                <a16:creationId xmlns:a16="http://schemas.microsoft.com/office/drawing/2014/main" id="{3A37ACBE-6464-E474-B5B0-E74A9BD5D865}"/>
+              </a:ext>
+            </a:extLst>
+          </p:cNvPr>
+          <p:cNvPicPr>
+            <a:picLocks noChangeAspect="1"/>
+          </p:cNvPicPr>
+          <p:nvPr/>
+        </p:nvPicPr>
+        <p:blipFill>
+          <a:blip r:embed="rId2"/>
+          <a:stretch>
+            <a:fillRect/>
+          </a:stretch>
+        </p:blipFill>
+        <p:spPr>
+          <a:xfrm>
+            <a:off x="489284" y="1155095"/>
+            <a:ext cx="11213432" cy="5566380"/>
+          </a:xfrm>
+          <a:prstGeom prst="rect">
+            <a:avLst/>
+          </a:prstGeom>
+        </p:spPr>
+      </p:pic>
+    </p:spTree>
+    <p:extLst>
+      <p:ext uri="{BB962C8B-B14F-4D97-AF65-F5344CB8AC3E}">
+        <p14:creationId xmlns:p14="http://schemas.microsoft.com/office/powerpoint/2010/main" val="2511749758"/>
+      </p:ext>
+    </p:extLst>
+  </p:cSld>
+  <p:clrMapOvr>
+    <a:masterClrMapping/>
+  </p:clrMapOvr>
+</p:sld>
+</file>
+
+<file path=ppt/slides/slide26.xml><?xml version="1.0" encoding="utf-8"?>
+<p:sld xmlns:a="http://schemas.openxmlformats.org/drawingml/2006/main" xmlns:r="http://schemas.openxmlformats.org/officeDocument/2006/relationships" xmlns:p="http://schemas.openxmlformats.org/presentationml/2006/main">
+  <p:cSld>
+    <p:spTree>
+      <p:nvGrpSpPr>
+        <p:cNvPr id="1" name="">
+          <a:extLst>
+            <a:ext uri="{FF2B5EF4-FFF2-40B4-BE49-F238E27FC236}">
+              <a16:creationId xmlns:a16="http://schemas.microsoft.com/office/drawing/2014/main" id="{E2F44108-31A0-F991-5BA6-18F0F4162BA3}"/>
+            </a:ext>
+          </a:extLst>
+        </p:cNvPr>
+        <p:cNvGrpSpPr/>
+        <p:nvPr/>
+      </p:nvGrpSpPr>
+      <p:grpSpPr>
+        <a:xfrm>
+          <a:off x="0" y="0"/>
+          <a:ext cx="0" cy="0"/>
+          <a:chOff x="0" y="0"/>
+          <a:chExt cx="0" cy="0"/>
+        </a:xfrm>
+      </p:grpSpPr>
+      <p:sp>
+        <p:nvSpPr>
+          <p:cNvPr id="6" name="Slide Number Placeholder 5">
+            <a:extLst>
+              <a:ext uri="{FF2B5EF4-FFF2-40B4-BE49-F238E27FC236}">
+                <a16:creationId xmlns:a16="http://schemas.microsoft.com/office/drawing/2014/main" id="{EFC53051-4D53-69B9-34A4-02FD3E3206E3}"/>
+              </a:ext>
+            </a:extLst>
+          </p:cNvPr>
+          <p:cNvSpPr>
+            <a:spLocks noGrp="1"/>
+          </p:cNvSpPr>
+          <p:nvPr>
+            <p:ph type="sldNum" sz="quarter" idx="12"/>
+          </p:nvPr>
+        </p:nvSpPr>
+        <p:spPr/>
+        <p:txBody>
+          <a:bodyPr/>
+          <a:lstStyle/>
+          <a:p>
+            <a:pPr rtl="0"/>
+            <a:fld id="{B5CEABB6-07DC-46E8-9B57-56EC44A396E5}" type="slidenum">
+              <a:rPr lang="pt-PT" noProof="0" smtClean="0"/>
+              <a:pPr rtl="0"/>
+              <a:t>26</a:t>
+            </a:fld>
+            <a:endParaRPr lang="pt-PT" noProof="0"/>
+          </a:p>
+        </p:txBody>
+      </p:sp>
+      <p:pic>
+        <p:nvPicPr>
+          <p:cNvPr id="4" name="Picture 3" descr="A screenshot of a graph&#10;&#10;AI-generated content may be incorrect.">
+            <a:extLst>
+              <a:ext uri="{FF2B5EF4-FFF2-40B4-BE49-F238E27FC236}">
+                <a16:creationId xmlns:a16="http://schemas.microsoft.com/office/drawing/2014/main" id="{6C6D5EF8-AAB4-D891-DC17-C5638AFE624B}"/>
+              </a:ext>
+            </a:extLst>
+          </p:cNvPr>
+          <p:cNvPicPr>
+            <a:picLocks noChangeAspect="1"/>
+          </p:cNvPicPr>
+          <p:nvPr/>
+        </p:nvPicPr>
+        <p:blipFill>
+          <a:blip r:embed="rId2"/>
+          <a:stretch>
+            <a:fillRect/>
+          </a:stretch>
+        </p:blipFill>
+        <p:spPr>
+          <a:xfrm>
+            <a:off x="0" y="0"/>
+            <a:ext cx="5307690" cy="6858000"/>
+          </a:xfrm>
+          <a:prstGeom prst="rect">
+            <a:avLst/>
+          </a:prstGeom>
+        </p:spPr>
+      </p:pic>
+      <p:pic>
+        <p:nvPicPr>
+          <p:cNvPr id="10" name="Picture 9" descr="A graph showing a number of data&#10;&#10;AI-generated content may be incorrect.">
+            <a:extLst>
+              <a:ext uri="{FF2B5EF4-FFF2-40B4-BE49-F238E27FC236}">
+                <a16:creationId xmlns:a16="http://schemas.microsoft.com/office/drawing/2014/main" id="{93997495-B9E3-546F-5BC5-E105AF91152B}"/>
+              </a:ext>
+            </a:extLst>
+          </p:cNvPr>
+          <p:cNvPicPr>
+            <a:picLocks noChangeAspect="1"/>
+          </p:cNvPicPr>
+          <p:nvPr/>
+        </p:nvPicPr>
+        <p:blipFill>
+          <a:blip r:embed="rId3"/>
+          <a:stretch>
+            <a:fillRect/>
+          </a:stretch>
+        </p:blipFill>
+        <p:spPr>
+          <a:xfrm>
+            <a:off x="5409764" y="1744427"/>
+            <a:ext cx="6782236" cy="3369146"/>
+          </a:xfrm>
+          <a:prstGeom prst="rect">
+            <a:avLst/>
+          </a:prstGeom>
+        </p:spPr>
+      </p:pic>
+    </p:spTree>
+    <p:extLst>
+      <p:ext uri="{BB962C8B-B14F-4D97-AF65-F5344CB8AC3E}">
+        <p14:creationId xmlns:p14="http://schemas.microsoft.com/office/powerpoint/2010/main" val="1504287762"/>
+      </p:ext>
+    </p:extLst>
+  </p:cSld>
+  <p:clrMapOvr>
+    <a:masterClrMapping/>
+  </p:clrMapOvr>
+</p:sld>
+</file>
+
+<file path=ppt/slides/slide27.xml><?xml version="1.0" encoding="utf-8"?>
 <p:sld xmlns:a="http://schemas.openxmlformats.org/drawingml/2006/main" xmlns:r="http://schemas.openxmlformats.org/officeDocument/2006/relationships" xmlns:p="http://schemas.openxmlformats.org/presentationml/2006/main">
   <p:cSld>
     <p:spTree>
@@ -11418,7 +12047,7 @@
             <a:fld id="{B5CEABB6-07DC-46E8-9B57-56EC44A396E5}" type="slidenum">
               <a:rPr lang="pt-PT" noProof="0" smtClean="0"/>
               <a:pPr rtl="0"/>
-              <a:t>23</a:t>
+              <a:t>27</a:t>
             </a:fld>
             <a:endParaRPr lang="pt-PT" noProof="0"/>
           </a:p>
@@ -11426,10 +12055,10 @@
       </p:sp>
       <p:pic>
         <p:nvPicPr>
-          <p:cNvPr id="4" name="Picture 3">
-            <a:extLst>
-              <a:ext uri="{FF2B5EF4-FFF2-40B4-BE49-F238E27FC236}">
-                <a16:creationId xmlns:a16="http://schemas.microsoft.com/office/drawing/2014/main" id="{F29EFE39-E560-CFF0-383D-EB72C239A11E}"/>
+          <p:cNvPr id="5" name="Picture 4" descr="A graph of a number of different colored boxes&#10;&#10;AI-generated content may be incorrect.">
+            <a:extLst>
+              <a:ext uri="{FF2B5EF4-FFF2-40B4-BE49-F238E27FC236}">
+                <a16:creationId xmlns:a16="http://schemas.microsoft.com/office/drawing/2014/main" id="{B7C4FFA8-749D-6F2A-A660-6C8553FE53DC}"/>
               </a:ext>
             </a:extLst>
           </p:cNvPr>
@@ -11446,8 +12075,8 @@
         </p:blipFill>
         <p:spPr>
           <a:xfrm>
-            <a:off x="900035" y="1199716"/>
-            <a:ext cx="10391929" cy="5156634"/>
+            <a:off x="1124024" y="1422009"/>
+            <a:ext cx="9943951" cy="4934341"/>
           </a:xfrm>
           <a:prstGeom prst="rect">
             <a:avLst/>
@@ -11467,7 +12096,7 @@
 </p:sld>
 </file>
 
-<file path=ppt/slides/slide24.xml><?xml version="1.0" encoding="utf-8"?>
+<file path=ppt/slides/slide28.xml><?xml version="1.0" encoding="utf-8"?>
 <p:sld xmlns:a="http://schemas.openxmlformats.org/drawingml/2006/main" xmlns:r="http://schemas.openxmlformats.org/officeDocument/2006/relationships" xmlns:p="http://schemas.openxmlformats.org/presentationml/2006/main">
   <p:cSld>
     <p:spTree>
@@ -11548,7 +12177,7 @@
             <a:fld id="{B5CEABB6-07DC-46E8-9B57-56EC44A396E5}" type="slidenum">
               <a:rPr lang="pt-PT" noProof="0" smtClean="0"/>
               <a:pPr rtl="0"/>
-              <a:t>24</a:t>
+              <a:t>28</a:t>
             </a:fld>
             <a:endParaRPr lang="pt-PT" noProof="0"/>
           </a:p>
@@ -11556,10 +12185,10 @@
       </p:sp>
       <p:pic>
         <p:nvPicPr>
-          <p:cNvPr id="5" name="Picture 4">
-            <a:extLst>
-              <a:ext uri="{FF2B5EF4-FFF2-40B4-BE49-F238E27FC236}">
-                <a16:creationId xmlns:a16="http://schemas.microsoft.com/office/drawing/2014/main" id="{EC635D29-4121-12E4-4F55-1B51C1D1A6D6}"/>
+          <p:cNvPr id="4" name="Picture 3" descr="A graph of a number of objects&#10;&#10;AI-generated content may be incorrect.">
+            <a:extLst>
+              <a:ext uri="{FF2B5EF4-FFF2-40B4-BE49-F238E27FC236}">
+                <a16:creationId xmlns:a16="http://schemas.microsoft.com/office/drawing/2014/main" id="{8CDE2AB6-2963-1450-131A-8DD0677C5AAF}"/>
               </a:ext>
             </a:extLst>
           </p:cNvPr>
@@ -11576,8 +12205,8 @@
         </p:blipFill>
         <p:spPr>
           <a:xfrm>
-            <a:off x="1" y="3986784"/>
-            <a:ext cx="5786230" cy="2871216"/>
+            <a:off x="0" y="1081404"/>
+            <a:ext cx="5773611" cy="2864954"/>
           </a:xfrm>
           <a:prstGeom prst="rect">
             <a:avLst/>
@@ -11586,10 +12215,10 @@
       </p:pic>
       <p:pic>
         <p:nvPicPr>
-          <p:cNvPr id="8" name="Picture 7">
-            <a:extLst>
-              <a:ext uri="{FF2B5EF4-FFF2-40B4-BE49-F238E27FC236}">
-                <a16:creationId xmlns:a16="http://schemas.microsoft.com/office/drawing/2014/main" id="{FE82BAF3-EC22-15F9-1148-9DA60CF26D12}"/>
+          <p:cNvPr id="9" name="Picture 8" descr="A graph of a number of different levels&#10;&#10;AI-generated content may be incorrect.">
+            <a:extLst>
+              <a:ext uri="{FF2B5EF4-FFF2-40B4-BE49-F238E27FC236}">
+                <a16:creationId xmlns:a16="http://schemas.microsoft.com/office/drawing/2014/main" id="{D5431C97-80B9-CED3-E934-48D6F105B7EC}"/>
               </a:ext>
             </a:extLst>
           </p:cNvPr>
@@ -11606,8 +12235,8 @@
         </p:blipFill>
         <p:spPr>
           <a:xfrm>
-            <a:off x="1" y="1081402"/>
-            <a:ext cx="5786228" cy="2871215"/>
+            <a:off x="6418388" y="1081405"/>
+            <a:ext cx="5773611" cy="2864954"/>
           </a:xfrm>
           <a:prstGeom prst="rect">
             <a:avLst/>
@@ -11616,10 +12245,10 @@
       </p:pic>
       <p:pic>
         <p:nvPicPr>
-          <p:cNvPr id="10" name="Picture 9">
-            <a:extLst>
-              <a:ext uri="{FF2B5EF4-FFF2-40B4-BE49-F238E27FC236}">
-                <a16:creationId xmlns:a16="http://schemas.microsoft.com/office/drawing/2014/main" id="{390144C7-3FFA-C0D0-010B-A5CEB6C08B4D}"/>
+          <p:cNvPr id="13" name="Picture 12" descr="A graph with green squares&#10;&#10;AI-generated content may be incorrect.">
+            <a:extLst>
+              <a:ext uri="{FF2B5EF4-FFF2-40B4-BE49-F238E27FC236}">
+                <a16:creationId xmlns:a16="http://schemas.microsoft.com/office/drawing/2014/main" id="{76189A9E-7FE8-B173-39C3-15800E37EA90}"/>
               </a:ext>
             </a:extLst>
           </p:cNvPr>
@@ -11636,8 +12265,8 @@
         </p:blipFill>
         <p:spPr>
           <a:xfrm>
-            <a:off x="6405771" y="3992426"/>
-            <a:ext cx="5774860" cy="2865574"/>
+            <a:off x="0" y="3993046"/>
+            <a:ext cx="5773611" cy="2864954"/>
           </a:xfrm>
           <a:prstGeom prst="rect">
             <a:avLst/>
@@ -11646,10 +12275,10 @@
       </p:pic>
       <p:pic>
         <p:nvPicPr>
-          <p:cNvPr id="12" name="Picture 11">
-            <a:extLst>
-              <a:ext uri="{FF2B5EF4-FFF2-40B4-BE49-F238E27FC236}">
-                <a16:creationId xmlns:a16="http://schemas.microsoft.com/office/drawing/2014/main" id="{26FE3095-EA34-7F21-9E28-2E9492F07ED1}"/>
+          <p:cNvPr id="15" name="Picture 14" descr="A graph of a bar graph&#10;&#10;AI-generated content may be incorrect.">
+            <a:extLst>
+              <a:ext uri="{FF2B5EF4-FFF2-40B4-BE49-F238E27FC236}">
+                <a16:creationId xmlns:a16="http://schemas.microsoft.com/office/drawing/2014/main" id="{BC2AFFD7-6218-B590-89FF-7D222FDBDA6E}"/>
               </a:ext>
             </a:extLst>
           </p:cNvPr>
@@ -11666,8 +12295,8 @@
         </p:blipFill>
         <p:spPr>
           <a:xfrm>
-            <a:off x="6417140" y="1081402"/>
-            <a:ext cx="5774860" cy="2865574"/>
+            <a:off x="6418388" y="3993045"/>
+            <a:ext cx="5773612" cy="2864955"/>
           </a:xfrm>
           <a:prstGeom prst="rect">
             <a:avLst/>
@@ -11687,7 +12316,7 @@
 </p:sld>
 </file>
 
-<file path=ppt/slides/slide25.xml><?xml version="1.0" encoding="utf-8"?>
+<file path=ppt/slides/slide29.xml><?xml version="1.0" encoding="utf-8"?>
 <p:sld xmlns:a="http://schemas.openxmlformats.org/drawingml/2006/main" xmlns:r="http://schemas.openxmlformats.org/officeDocument/2006/relationships" xmlns:p="http://schemas.openxmlformats.org/presentationml/2006/main">
   <p:cSld>
     <p:spTree>
@@ -11803,7 +12432,7 @@
             <a:fld id="{B5CEABB6-07DC-46E8-9B57-56EC44A396E5}" type="slidenum">
               <a:rPr lang="pt-PT" noProof="0" smtClean="0"/>
               <a:pPr rtl="0"/>
-              <a:t>25</a:t>
+              <a:t>29</a:t>
             </a:fld>
             <a:endParaRPr lang="pt-PT" noProof="0"/>
           </a:p>
@@ -11811,10 +12440,10 @@
       </p:sp>
       <p:pic>
         <p:nvPicPr>
-          <p:cNvPr id="4" name="Picture 3">
-            <a:extLst>
-              <a:ext uri="{FF2B5EF4-FFF2-40B4-BE49-F238E27FC236}">
-                <a16:creationId xmlns:a16="http://schemas.microsoft.com/office/drawing/2014/main" id="{CB5B2C24-3027-F1F4-7A46-2B5056C606A5}"/>
+          <p:cNvPr id="5" name="Picture 4">
+            <a:extLst>
+              <a:ext uri="{FF2B5EF4-FFF2-40B4-BE49-F238E27FC236}">
+                <a16:creationId xmlns:a16="http://schemas.microsoft.com/office/drawing/2014/main" id="{850E61EE-C5C8-1ADF-A2F4-65DB3CF58393}"/>
               </a:ext>
             </a:extLst>
           </p:cNvPr>
@@ -11831,8 +12460,8 @@
         </p:blipFill>
         <p:spPr>
           <a:xfrm>
-            <a:off x="7910223" y="3280207"/>
-            <a:ext cx="4143953" cy="1143160"/>
+            <a:off x="8110276" y="2880560"/>
+            <a:ext cx="3743847" cy="1676634"/>
           </a:xfrm>
           <a:prstGeom prst="rect">
             <a:avLst/>
@@ -11841,10 +12470,10 @@
       </p:pic>
       <p:pic>
         <p:nvPicPr>
-          <p:cNvPr id="8" name="Picture 7">
-            <a:extLst>
-              <a:ext uri="{FF2B5EF4-FFF2-40B4-BE49-F238E27FC236}">
-                <a16:creationId xmlns:a16="http://schemas.microsoft.com/office/drawing/2014/main" id="{E5DA56CE-1A3C-A958-1674-91ABF40AFDB3}"/>
+          <p:cNvPr id="9" name="Picture 8" descr="A graph of a number of fire and no fire days by region&#10;&#10;AI-generated content may be incorrect.">
+            <a:extLst>
+              <a:ext uri="{FF2B5EF4-FFF2-40B4-BE49-F238E27FC236}">
+                <a16:creationId xmlns:a16="http://schemas.microsoft.com/office/drawing/2014/main" id="{7A3FFAC6-1F8D-525A-6E36-00BCAB38B3E6}"/>
               </a:ext>
             </a:extLst>
           </p:cNvPr>
@@ -11861,8 +12490,8 @@
         </p:blipFill>
         <p:spPr>
           <a:xfrm>
-            <a:off x="105704" y="1523846"/>
-            <a:ext cx="7804519" cy="4655881"/>
+            <a:off x="308370" y="1467836"/>
+            <a:ext cx="7546710" cy="4502082"/>
           </a:xfrm>
           <a:prstGeom prst="rect">
             <a:avLst/>
@@ -11890,6 +12519,718 @@
         <p:cNvPr id="1" name="">
           <a:extLst>
             <a:ext uri="{FF2B5EF4-FFF2-40B4-BE49-F238E27FC236}">
+              <a16:creationId xmlns:a16="http://schemas.microsoft.com/office/drawing/2014/main" id="{C22251EF-0584-2538-6DA8-F5586895A0A9}"/>
+            </a:ext>
+          </a:extLst>
+        </p:cNvPr>
+        <p:cNvGrpSpPr/>
+        <p:nvPr/>
+      </p:nvGrpSpPr>
+      <p:grpSpPr>
+        <a:xfrm>
+          <a:off x="0" y="0"/>
+          <a:ext cx="0" cy="0"/>
+          <a:chOff x="0" y="0"/>
+          <a:chExt cx="0" cy="0"/>
+        </a:xfrm>
+      </p:grpSpPr>
+      <p:sp>
+        <p:nvSpPr>
+          <p:cNvPr id="2" name="Title 1">
+            <a:extLst>
+              <a:ext uri="{FF2B5EF4-FFF2-40B4-BE49-F238E27FC236}">
+                <a16:creationId xmlns:a16="http://schemas.microsoft.com/office/drawing/2014/main" id="{39B5DF7A-8EE4-41FC-8F76-ED1A63BF5F92}"/>
+              </a:ext>
+            </a:extLst>
+          </p:cNvPr>
+          <p:cNvSpPr>
+            <a:spLocks noGrp="1"/>
+          </p:cNvSpPr>
+          <p:nvPr>
+            <p:ph type="title"/>
+          </p:nvPr>
+        </p:nvSpPr>
+        <p:spPr>
+          <a:xfrm>
+            <a:off x="3253740" y="259589"/>
+            <a:ext cx="5684520" cy="821815"/>
+          </a:xfrm>
+        </p:spPr>
+        <p:txBody>
+          <a:bodyPr/>
+          <a:lstStyle/>
+          <a:p>
+            <a:r>
+              <a:rPr lang="pt-PT" dirty="0" err="1"/>
+              <a:t>Study</a:t>
+            </a:r>
+            <a:r>
+              <a:rPr lang="pt-PT" dirty="0"/>
+              <a:t> </a:t>
+            </a:r>
+            <a:r>
+              <a:rPr lang="pt-PT" dirty="0" err="1"/>
+              <a:t>Area</a:t>
+            </a:r>
+            <a:endParaRPr lang="pt-PT" dirty="0"/>
+          </a:p>
+        </p:txBody>
+      </p:sp>
+      <p:sp>
+        <p:nvSpPr>
+          <p:cNvPr id="6" name="Slide Number Placeholder 5">
+            <a:extLst>
+              <a:ext uri="{FF2B5EF4-FFF2-40B4-BE49-F238E27FC236}">
+                <a16:creationId xmlns:a16="http://schemas.microsoft.com/office/drawing/2014/main" id="{62AF656F-5695-4424-BDF7-A3F9053BC387}"/>
+              </a:ext>
+            </a:extLst>
+          </p:cNvPr>
+          <p:cNvSpPr>
+            <a:spLocks noGrp="1"/>
+          </p:cNvSpPr>
+          <p:nvPr>
+            <p:ph type="sldNum" sz="quarter" idx="12"/>
+          </p:nvPr>
+        </p:nvSpPr>
+        <p:spPr/>
+        <p:txBody>
+          <a:bodyPr/>
+          <a:lstStyle/>
+          <a:p>
+            <a:pPr rtl="0"/>
+            <a:fld id="{B5CEABB6-07DC-46E8-9B57-56EC44A396E5}" type="slidenum">
+              <a:rPr lang="pt-PT" noProof="0" smtClean="0"/>
+              <a:pPr rtl="0"/>
+              <a:t>3</a:t>
+            </a:fld>
+            <a:endParaRPr lang="pt-PT" noProof="0"/>
+          </a:p>
+        </p:txBody>
+      </p:sp>
+      <p:pic>
+        <p:nvPicPr>
+          <p:cNvPr id="8" name="Content Placeholder 7" descr="A map of europe with different countries/regions&#10;&#10;AI-generated content may be incorrect.">
+            <a:extLst>
+              <a:ext uri="{FF2B5EF4-FFF2-40B4-BE49-F238E27FC236}">
+                <a16:creationId xmlns:a16="http://schemas.microsoft.com/office/drawing/2014/main" id="{DE22A430-0B44-D0F1-8F03-75A9762C4C93}"/>
+              </a:ext>
+            </a:extLst>
+          </p:cNvPr>
+          <p:cNvPicPr>
+            <a:picLocks noGrp="1" noChangeAspect="1"/>
+          </p:cNvPicPr>
+          <p:nvPr>
+            <p:ph idx="1"/>
+          </p:nvPr>
+        </p:nvPicPr>
+        <p:blipFill>
+          <a:blip r:embed="rId2"/>
+          <a:stretch>
+            <a:fillRect/>
+          </a:stretch>
+        </p:blipFill>
+        <p:spPr>
+          <a:xfrm>
+            <a:off x="2357145" y="1343295"/>
+            <a:ext cx="7477710" cy="5255116"/>
+          </a:xfrm>
+        </p:spPr>
+      </p:pic>
+    </p:spTree>
+    <p:extLst>
+      <p:ext uri="{BB962C8B-B14F-4D97-AF65-F5344CB8AC3E}">
+        <p14:creationId xmlns:p14="http://schemas.microsoft.com/office/powerpoint/2010/main" val="4070214374"/>
+      </p:ext>
+    </p:extLst>
+  </p:cSld>
+  <p:clrMapOvr>
+    <a:masterClrMapping/>
+  </p:clrMapOvr>
+</p:sld>
+</file>
+
+<file path=ppt/slides/slide30.xml><?xml version="1.0" encoding="utf-8"?>
+<p:sld xmlns:a="http://schemas.openxmlformats.org/drawingml/2006/main" xmlns:r="http://schemas.openxmlformats.org/officeDocument/2006/relationships" xmlns:p="http://schemas.openxmlformats.org/presentationml/2006/main">
+  <p:cSld>
+    <p:spTree>
+      <p:nvGrpSpPr>
+        <p:cNvPr id="1" name="">
+          <a:extLst>
+            <a:ext uri="{FF2B5EF4-FFF2-40B4-BE49-F238E27FC236}">
+              <a16:creationId xmlns:a16="http://schemas.microsoft.com/office/drawing/2014/main" id="{C6BAD421-4BFC-A996-8238-C9FF71E4A5B9}"/>
+            </a:ext>
+          </a:extLst>
+        </p:cNvPr>
+        <p:cNvGrpSpPr/>
+        <p:nvPr/>
+      </p:nvGrpSpPr>
+      <p:grpSpPr>
+        <a:xfrm>
+          <a:off x="0" y="0"/>
+          <a:ext cx="0" cy="0"/>
+          <a:chOff x="0" y="0"/>
+          <a:chExt cx="0" cy="0"/>
+        </a:xfrm>
+      </p:grpSpPr>
+      <p:sp>
+        <p:nvSpPr>
+          <p:cNvPr id="2" name="Title 1">
+            <a:extLst>
+              <a:ext uri="{FF2B5EF4-FFF2-40B4-BE49-F238E27FC236}">
+                <a16:creationId xmlns:a16="http://schemas.microsoft.com/office/drawing/2014/main" id="{1D664F3C-1855-910D-0601-C42F0D2C01ED}"/>
+              </a:ext>
+            </a:extLst>
+          </p:cNvPr>
+          <p:cNvSpPr>
+            <a:spLocks noGrp="1"/>
+          </p:cNvSpPr>
+          <p:nvPr>
+            <p:ph type="title"/>
+          </p:nvPr>
+        </p:nvSpPr>
+        <p:spPr>
+          <a:xfrm>
+            <a:off x="2433066" y="259589"/>
+            <a:ext cx="7325868" cy="821815"/>
+          </a:xfrm>
+        </p:spPr>
+        <p:txBody>
+          <a:bodyPr>
+            <a:normAutofit/>
+          </a:bodyPr>
+          <a:lstStyle/>
+          <a:p>
+            <a:r>
+              <a:rPr lang="pt-PT" dirty="0"/>
+              <a:t>Hotspots</a:t>
+            </a:r>
+          </a:p>
+        </p:txBody>
+      </p:sp>
+      <p:sp>
+        <p:nvSpPr>
+          <p:cNvPr id="6" name="Slide Number Placeholder 5">
+            <a:extLst>
+              <a:ext uri="{FF2B5EF4-FFF2-40B4-BE49-F238E27FC236}">
+                <a16:creationId xmlns:a16="http://schemas.microsoft.com/office/drawing/2014/main" id="{0A0074B3-B155-EE53-7F4A-C00D8C2BFD62}"/>
+              </a:ext>
+            </a:extLst>
+          </p:cNvPr>
+          <p:cNvSpPr>
+            <a:spLocks noGrp="1"/>
+          </p:cNvSpPr>
+          <p:nvPr>
+            <p:ph type="sldNum" sz="quarter" idx="12"/>
+          </p:nvPr>
+        </p:nvSpPr>
+        <p:spPr/>
+        <p:txBody>
+          <a:bodyPr/>
+          <a:lstStyle/>
+          <a:p>
+            <a:pPr rtl="0"/>
+            <a:fld id="{B5CEABB6-07DC-46E8-9B57-56EC44A396E5}" type="slidenum">
+              <a:rPr lang="pt-PT" noProof="0" smtClean="0"/>
+              <a:pPr rtl="0"/>
+              <a:t>30</a:t>
+            </a:fld>
+            <a:endParaRPr lang="pt-PT" noProof="0"/>
+          </a:p>
+        </p:txBody>
+      </p:sp>
+      <p:pic>
+        <p:nvPicPr>
+          <p:cNvPr id="4" name="Picture 3" descr="A graph of a number of hotspots&#10;&#10;AI-generated content may be incorrect.">
+            <a:extLst>
+              <a:ext uri="{FF2B5EF4-FFF2-40B4-BE49-F238E27FC236}">
+                <a16:creationId xmlns:a16="http://schemas.microsoft.com/office/drawing/2014/main" id="{DF1F2099-1391-16AB-2719-6854B2889212}"/>
+              </a:ext>
+            </a:extLst>
+          </p:cNvPr>
+          <p:cNvPicPr>
+            <a:picLocks noChangeAspect="1"/>
+          </p:cNvPicPr>
+          <p:nvPr/>
+        </p:nvPicPr>
+        <p:blipFill>
+          <a:blip r:embed="rId2"/>
+          <a:stretch>
+            <a:fillRect/>
+          </a:stretch>
+        </p:blipFill>
+        <p:spPr>
+          <a:xfrm>
+            <a:off x="0" y="1081405"/>
+            <a:ext cx="5710989" cy="2829509"/>
+          </a:xfrm>
+          <a:prstGeom prst="rect">
+            <a:avLst/>
+          </a:prstGeom>
+        </p:spPr>
+      </p:pic>
+      <p:pic>
+        <p:nvPicPr>
+          <p:cNvPr id="8" name="Picture 7" descr="A graph of a number of hotspots&#10;&#10;AI-generated content may be incorrect.">
+            <a:extLst>
+              <a:ext uri="{FF2B5EF4-FFF2-40B4-BE49-F238E27FC236}">
+                <a16:creationId xmlns:a16="http://schemas.microsoft.com/office/drawing/2014/main" id="{484B9A31-E59D-F9D7-8AC9-021C91D05159}"/>
+              </a:ext>
+            </a:extLst>
+          </p:cNvPr>
+          <p:cNvPicPr>
+            <a:picLocks noChangeAspect="1"/>
+          </p:cNvPicPr>
+          <p:nvPr/>
+        </p:nvPicPr>
+        <p:blipFill>
+          <a:blip r:embed="rId3"/>
+          <a:stretch>
+            <a:fillRect/>
+          </a:stretch>
+        </p:blipFill>
+        <p:spPr>
+          <a:xfrm>
+            <a:off x="6481010" y="1081404"/>
+            <a:ext cx="5710989" cy="2829509"/>
+          </a:xfrm>
+          <a:prstGeom prst="rect">
+            <a:avLst/>
+          </a:prstGeom>
+        </p:spPr>
+      </p:pic>
+      <p:pic>
+        <p:nvPicPr>
+          <p:cNvPr id="11" name="Picture 10" descr="A graph of green bars&#10;&#10;AI-generated content may be incorrect.">
+            <a:extLst>
+              <a:ext uri="{FF2B5EF4-FFF2-40B4-BE49-F238E27FC236}">
+                <a16:creationId xmlns:a16="http://schemas.microsoft.com/office/drawing/2014/main" id="{886AC1CC-A802-AA6C-5283-E3EC951CA697}"/>
+              </a:ext>
+            </a:extLst>
+          </p:cNvPr>
+          <p:cNvPicPr>
+            <a:picLocks noChangeAspect="1"/>
+          </p:cNvPicPr>
+          <p:nvPr/>
+        </p:nvPicPr>
+        <p:blipFill>
+          <a:blip r:embed="rId4"/>
+          <a:stretch>
+            <a:fillRect/>
+          </a:stretch>
+        </p:blipFill>
+        <p:spPr>
+          <a:xfrm>
+            <a:off x="0" y="4044534"/>
+            <a:ext cx="5710989" cy="2829509"/>
+          </a:xfrm>
+          <a:prstGeom prst="rect">
+            <a:avLst/>
+          </a:prstGeom>
+        </p:spPr>
+      </p:pic>
+      <p:pic>
+        <p:nvPicPr>
+          <p:cNvPr id="13" name="Picture 12" descr="A graph of a number of hotspots&#10;&#10;AI-generated content may be incorrect.">
+            <a:extLst>
+              <a:ext uri="{FF2B5EF4-FFF2-40B4-BE49-F238E27FC236}">
+                <a16:creationId xmlns:a16="http://schemas.microsoft.com/office/drawing/2014/main" id="{7047C03A-7BB6-97E2-2478-E747BDD3A1EE}"/>
+              </a:ext>
+            </a:extLst>
+          </p:cNvPr>
+          <p:cNvPicPr>
+            <a:picLocks noChangeAspect="1"/>
+          </p:cNvPicPr>
+          <p:nvPr/>
+        </p:nvPicPr>
+        <p:blipFill>
+          <a:blip r:embed="rId5"/>
+          <a:stretch>
+            <a:fillRect/>
+          </a:stretch>
+        </p:blipFill>
+        <p:spPr>
+          <a:xfrm>
+            <a:off x="6481009" y="4028491"/>
+            <a:ext cx="5710989" cy="2829509"/>
+          </a:xfrm>
+          <a:prstGeom prst="rect">
+            <a:avLst/>
+          </a:prstGeom>
+        </p:spPr>
+      </p:pic>
+    </p:spTree>
+    <p:extLst>
+      <p:ext uri="{BB962C8B-B14F-4D97-AF65-F5344CB8AC3E}">
+        <p14:creationId xmlns:p14="http://schemas.microsoft.com/office/powerpoint/2010/main" val="1278097520"/>
+      </p:ext>
+    </p:extLst>
+  </p:cSld>
+  <p:clrMapOvr>
+    <a:masterClrMapping/>
+  </p:clrMapOvr>
+</p:sld>
+</file>
+
+<file path=ppt/slides/slide31.xml><?xml version="1.0" encoding="utf-8"?>
+<p:sld xmlns:a="http://schemas.openxmlformats.org/drawingml/2006/main" xmlns:r="http://schemas.openxmlformats.org/officeDocument/2006/relationships" xmlns:p="http://schemas.openxmlformats.org/presentationml/2006/main">
+  <p:cSld>
+    <p:spTree>
+      <p:nvGrpSpPr>
+        <p:cNvPr id="1" name="">
+          <a:extLst>
+            <a:ext uri="{FF2B5EF4-FFF2-40B4-BE49-F238E27FC236}">
+              <a16:creationId xmlns:a16="http://schemas.microsoft.com/office/drawing/2014/main" id="{05A2F46F-3E40-A950-3C8F-3F8BDB5F376E}"/>
+            </a:ext>
+          </a:extLst>
+        </p:cNvPr>
+        <p:cNvGrpSpPr/>
+        <p:nvPr/>
+      </p:nvGrpSpPr>
+      <p:grpSpPr>
+        <a:xfrm>
+          <a:off x="0" y="0"/>
+          <a:ext cx="0" cy="0"/>
+          <a:chOff x="0" y="0"/>
+          <a:chExt cx="0" cy="0"/>
+        </a:xfrm>
+      </p:grpSpPr>
+      <p:sp>
+        <p:nvSpPr>
+          <p:cNvPr id="2" name="Title 1">
+            <a:extLst>
+              <a:ext uri="{FF2B5EF4-FFF2-40B4-BE49-F238E27FC236}">
+                <a16:creationId xmlns:a16="http://schemas.microsoft.com/office/drawing/2014/main" id="{FF115BDB-3152-DE0F-671F-499331850A4E}"/>
+              </a:ext>
+            </a:extLst>
+          </p:cNvPr>
+          <p:cNvSpPr>
+            <a:spLocks noGrp="1"/>
+          </p:cNvSpPr>
+          <p:nvPr>
+            <p:ph type="title"/>
+          </p:nvPr>
+        </p:nvSpPr>
+        <p:spPr>
+          <a:xfrm>
+            <a:off x="2433066" y="259589"/>
+            <a:ext cx="7325868" cy="821815"/>
+          </a:xfrm>
+        </p:spPr>
+        <p:txBody>
+          <a:bodyPr>
+            <a:normAutofit/>
+          </a:bodyPr>
+          <a:lstStyle/>
+          <a:p>
+            <a:r>
+              <a:rPr lang="pt-PT" dirty="0"/>
+              <a:t>Total FRP</a:t>
+            </a:r>
+          </a:p>
+        </p:txBody>
+      </p:sp>
+      <p:sp>
+        <p:nvSpPr>
+          <p:cNvPr id="6" name="Slide Number Placeholder 5">
+            <a:extLst>
+              <a:ext uri="{FF2B5EF4-FFF2-40B4-BE49-F238E27FC236}">
+                <a16:creationId xmlns:a16="http://schemas.microsoft.com/office/drawing/2014/main" id="{94CE8657-835B-A57C-1123-C619B3FF4754}"/>
+              </a:ext>
+            </a:extLst>
+          </p:cNvPr>
+          <p:cNvSpPr>
+            <a:spLocks noGrp="1"/>
+          </p:cNvSpPr>
+          <p:nvPr>
+            <p:ph type="sldNum" sz="quarter" idx="12"/>
+          </p:nvPr>
+        </p:nvSpPr>
+        <p:spPr/>
+        <p:txBody>
+          <a:bodyPr/>
+          <a:lstStyle/>
+          <a:p>
+            <a:pPr rtl="0"/>
+            <a:fld id="{B5CEABB6-07DC-46E8-9B57-56EC44A396E5}" type="slidenum">
+              <a:rPr lang="pt-PT" noProof="0" smtClean="0"/>
+              <a:pPr rtl="0"/>
+              <a:t>31</a:t>
+            </a:fld>
+            <a:endParaRPr lang="pt-PT" noProof="0"/>
+          </a:p>
+        </p:txBody>
+      </p:sp>
+      <p:pic>
+        <p:nvPicPr>
+          <p:cNvPr id="5" name="Picture 4" descr="A graph of a number of blue bars&#10;&#10;AI-generated content may be incorrect.">
+            <a:extLst>
+              <a:ext uri="{FF2B5EF4-FFF2-40B4-BE49-F238E27FC236}">
+                <a16:creationId xmlns:a16="http://schemas.microsoft.com/office/drawing/2014/main" id="{914A7C70-823F-7416-EB8C-8A86E953B6CC}"/>
+              </a:ext>
+            </a:extLst>
+          </p:cNvPr>
+          <p:cNvPicPr>
+            <a:picLocks noChangeAspect="1"/>
+          </p:cNvPicPr>
+          <p:nvPr/>
+        </p:nvPicPr>
+        <p:blipFill>
+          <a:blip r:embed="rId2"/>
+          <a:stretch>
+            <a:fillRect/>
+          </a:stretch>
+        </p:blipFill>
+        <p:spPr>
+          <a:xfrm>
+            <a:off x="0" y="1081405"/>
+            <a:ext cx="5847287" cy="2897038"/>
+          </a:xfrm>
+          <a:prstGeom prst="rect">
+            <a:avLst/>
+          </a:prstGeom>
+        </p:spPr>
+      </p:pic>
+      <p:pic>
+        <p:nvPicPr>
+          <p:cNvPr id="9" name="Picture 8" descr="A graph of a number of red columns&#10;&#10;AI-generated content may be incorrect.">
+            <a:extLst>
+              <a:ext uri="{FF2B5EF4-FFF2-40B4-BE49-F238E27FC236}">
+                <a16:creationId xmlns:a16="http://schemas.microsoft.com/office/drawing/2014/main" id="{59100A56-D74C-C8FA-BA90-76A89CDF26F1}"/>
+              </a:ext>
+            </a:extLst>
+          </p:cNvPr>
+          <p:cNvPicPr>
+            <a:picLocks noChangeAspect="1"/>
+          </p:cNvPicPr>
+          <p:nvPr/>
+        </p:nvPicPr>
+        <p:blipFill>
+          <a:blip r:embed="rId3"/>
+          <a:stretch>
+            <a:fillRect/>
+          </a:stretch>
+        </p:blipFill>
+        <p:spPr>
+          <a:xfrm>
+            <a:off x="6344712" y="1081405"/>
+            <a:ext cx="5847287" cy="2897038"/>
+          </a:xfrm>
+          <a:prstGeom prst="rect">
+            <a:avLst/>
+          </a:prstGeom>
+        </p:spPr>
+      </p:pic>
+      <p:pic>
+        <p:nvPicPr>
+          <p:cNvPr id="12" name="Picture 11" descr="A graph of green bars&#10;&#10;AI-generated content may be incorrect.">
+            <a:extLst>
+              <a:ext uri="{FF2B5EF4-FFF2-40B4-BE49-F238E27FC236}">
+                <a16:creationId xmlns:a16="http://schemas.microsoft.com/office/drawing/2014/main" id="{D004095E-2ABF-0B6D-1C6A-882249AAAF68}"/>
+              </a:ext>
+            </a:extLst>
+          </p:cNvPr>
+          <p:cNvPicPr>
+            <a:picLocks noChangeAspect="1"/>
+          </p:cNvPicPr>
+          <p:nvPr/>
+        </p:nvPicPr>
+        <p:blipFill>
+          <a:blip r:embed="rId4"/>
+          <a:stretch>
+            <a:fillRect/>
+          </a:stretch>
+        </p:blipFill>
+        <p:spPr>
+          <a:xfrm>
+            <a:off x="0" y="3960962"/>
+            <a:ext cx="5847287" cy="2897038"/>
+          </a:xfrm>
+          <a:prstGeom prst="rect">
+            <a:avLst/>
+          </a:prstGeom>
+        </p:spPr>
+      </p:pic>
+      <p:pic>
+        <p:nvPicPr>
+          <p:cNvPr id="15" name="Picture 14" descr="A graph of a number of orange bars&#10;&#10;AI-generated content may be incorrect.">
+            <a:extLst>
+              <a:ext uri="{FF2B5EF4-FFF2-40B4-BE49-F238E27FC236}">
+                <a16:creationId xmlns:a16="http://schemas.microsoft.com/office/drawing/2014/main" id="{5700262F-512F-3075-18B8-54194DC21AD1}"/>
+              </a:ext>
+            </a:extLst>
+          </p:cNvPr>
+          <p:cNvPicPr>
+            <a:picLocks noChangeAspect="1"/>
+          </p:cNvPicPr>
+          <p:nvPr/>
+        </p:nvPicPr>
+        <p:blipFill>
+          <a:blip r:embed="rId5"/>
+          <a:stretch>
+            <a:fillRect/>
+          </a:stretch>
+        </p:blipFill>
+        <p:spPr>
+          <a:xfrm>
+            <a:off x="6344711" y="3960962"/>
+            <a:ext cx="5847287" cy="2897038"/>
+          </a:xfrm>
+          <a:prstGeom prst="rect">
+            <a:avLst/>
+          </a:prstGeom>
+        </p:spPr>
+      </p:pic>
+    </p:spTree>
+    <p:extLst>
+      <p:ext uri="{BB962C8B-B14F-4D97-AF65-F5344CB8AC3E}">
+        <p14:creationId xmlns:p14="http://schemas.microsoft.com/office/powerpoint/2010/main" val="1012452184"/>
+      </p:ext>
+    </p:extLst>
+  </p:cSld>
+  <p:clrMapOvr>
+    <a:masterClrMapping/>
+  </p:clrMapOvr>
+</p:sld>
+</file>
+
+<file path=ppt/slides/slide4.xml><?xml version="1.0" encoding="utf-8"?>
+<p:sld xmlns:a="http://schemas.openxmlformats.org/drawingml/2006/main" xmlns:r="http://schemas.openxmlformats.org/officeDocument/2006/relationships" xmlns:p="http://schemas.openxmlformats.org/presentationml/2006/main">
+  <p:cSld>
+    <p:spTree>
+      <p:nvGrpSpPr>
+        <p:cNvPr id="1" name="">
+          <a:extLst>
+            <a:ext uri="{FF2B5EF4-FFF2-40B4-BE49-F238E27FC236}">
+              <a16:creationId xmlns:a16="http://schemas.microsoft.com/office/drawing/2014/main" id="{A40CA538-8444-D9E8-6F29-0E97F953BFC6}"/>
+            </a:ext>
+          </a:extLst>
+        </p:cNvPr>
+        <p:cNvGrpSpPr/>
+        <p:nvPr/>
+      </p:nvGrpSpPr>
+      <p:grpSpPr>
+        <a:xfrm>
+          <a:off x="0" y="0"/>
+          <a:ext cx="0" cy="0"/>
+          <a:chOff x="0" y="0"/>
+          <a:chExt cx="0" cy="0"/>
+        </a:xfrm>
+      </p:grpSpPr>
+      <p:sp>
+        <p:nvSpPr>
+          <p:cNvPr id="2" name="Title 1">
+            <a:extLst>
+              <a:ext uri="{FF2B5EF4-FFF2-40B4-BE49-F238E27FC236}">
+                <a16:creationId xmlns:a16="http://schemas.microsoft.com/office/drawing/2014/main" id="{20D4A457-A71A-D06F-64C4-99AF41B35A1A}"/>
+              </a:ext>
+            </a:extLst>
+          </p:cNvPr>
+          <p:cNvSpPr>
+            <a:spLocks noGrp="1"/>
+          </p:cNvSpPr>
+          <p:nvPr>
+            <p:ph type="title"/>
+          </p:nvPr>
+        </p:nvSpPr>
+        <p:spPr>
+          <a:xfrm>
+            <a:off x="3253740" y="259589"/>
+            <a:ext cx="5684520" cy="821815"/>
+          </a:xfrm>
+        </p:spPr>
+        <p:txBody>
+          <a:bodyPr/>
+          <a:lstStyle/>
+          <a:p>
+            <a:r>
+              <a:rPr lang="pt-PT" dirty="0" err="1"/>
+              <a:t>Masks</a:t>
+            </a:r>
+            <a:endParaRPr lang="pt-PT" dirty="0"/>
+          </a:p>
+        </p:txBody>
+      </p:sp>
+      <p:sp>
+        <p:nvSpPr>
+          <p:cNvPr id="6" name="Slide Number Placeholder 5">
+            <a:extLst>
+              <a:ext uri="{FF2B5EF4-FFF2-40B4-BE49-F238E27FC236}">
+                <a16:creationId xmlns:a16="http://schemas.microsoft.com/office/drawing/2014/main" id="{789A514D-7611-2850-44A3-D37A0E408893}"/>
+              </a:ext>
+            </a:extLst>
+          </p:cNvPr>
+          <p:cNvSpPr>
+            <a:spLocks noGrp="1"/>
+          </p:cNvSpPr>
+          <p:nvPr>
+            <p:ph type="sldNum" sz="quarter" idx="12"/>
+          </p:nvPr>
+        </p:nvSpPr>
+        <p:spPr/>
+        <p:txBody>
+          <a:bodyPr/>
+          <a:lstStyle/>
+          <a:p>
+            <a:pPr rtl="0"/>
+            <a:fld id="{B5CEABB6-07DC-46E8-9B57-56EC44A396E5}" type="slidenum">
+              <a:rPr lang="pt-PT" noProof="0" smtClean="0"/>
+              <a:pPr rtl="0"/>
+              <a:t>4</a:t>
+            </a:fld>
+            <a:endParaRPr lang="pt-PT" noProof="0"/>
+          </a:p>
+        </p:txBody>
+      </p:sp>
+      <p:pic>
+        <p:nvPicPr>
+          <p:cNvPr id="7" name="Content Placeholder 6" descr="A map of the world&#10;&#10;AI-generated content may be incorrect.">
+            <a:extLst>
+              <a:ext uri="{FF2B5EF4-FFF2-40B4-BE49-F238E27FC236}">
+                <a16:creationId xmlns:a16="http://schemas.microsoft.com/office/drawing/2014/main" id="{8B805E21-2E75-355F-4D07-9E1583CEA64A}"/>
+              </a:ext>
+            </a:extLst>
+          </p:cNvPr>
+          <p:cNvPicPr>
+            <a:picLocks noGrp="1" noChangeAspect="1"/>
+          </p:cNvPicPr>
+          <p:nvPr>
+            <p:ph idx="1"/>
+          </p:nvPr>
+        </p:nvPicPr>
+        <p:blipFill>
+          <a:blip r:embed="rId2"/>
+          <a:stretch>
+            <a:fillRect/>
+          </a:stretch>
+        </p:blipFill>
+        <p:spPr>
+          <a:xfrm>
+            <a:off x="2137423" y="1204468"/>
+            <a:ext cx="7917153" cy="5517007"/>
+          </a:xfrm>
+        </p:spPr>
+      </p:pic>
+    </p:spTree>
+    <p:extLst>
+      <p:ext uri="{BB962C8B-B14F-4D97-AF65-F5344CB8AC3E}">
+        <p14:creationId xmlns:p14="http://schemas.microsoft.com/office/powerpoint/2010/main" val="412263770"/>
+      </p:ext>
+    </p:extLst>
+  </p:cSld>
+  <p:clrMapOvr>
+    <a:masterClrMapping/>
+  </p:clrMapOvr>
+</p:sld>
+</file>
+
+<file path=ppt/slides/slide5.xml><?xml version="1.0" encoding="utf-8"?>
+<p:sld xmlns:a="http://schemas.openxmlformats.org/drawingml/2006/main" xmlns:r="http://schemas.openxmlformats.org/officeDocument/2006/relationships" xmlns:p="http://schemas.openxmlformats.org/presentationml/2006/main" show="0">
+  <p:cSld>
+    <p:spTree>
+      <p:nvGrpSpPr>
+        <p:cNvPr id="1" name="">
+          <a:extLst>
+            <a:ext uri="{FF2B5EF4-FFF2-40B4-BE49-F238E27FC236}">
               <a16:creationId xmlns:a16="http://schemas.microsoft.com/office/drawing/2014/main" id="{36D14C41-2FBE-4948-C085-0E3A5F7C8F28}"/>
             </a:ext>
           </a:extLst>
@@ -11963,7 +13304,7 @@
             <a:fld id="{B5CEABB6-07DC-46E8-9B57-56EC44A396E5}" type="slidenum">
               <a:rPr lang="pt-PT" noProof="0" smtClean="0"/>
               <a:pPr rtl="0"/>
-              <a:t>3</a:t>
+              <a:t>5</a:t>
             </a:fld>
             <a:endParaRPr lang="pt-PT" noProof="0"/>
           </a:p>
@@ -12012,8 +13353,8 @@
 </p:sld>
 </file>
 
-<file path=ppt/slides/slide4.xml><?xml version="1.0" encoding="utf-8"?>
-<p:sld xmlns:a="http://schemas.openxmlformats.org/drawingml/2006/main" xmlns:r="http://schemas.openxmlformats.org/officeDocument/2006/relationships" xmlns:p="http://schemas.openxmlformats.org/presentationml/2006/main">
+<file path=ppt/slides/slide6.xml><?xml version="1.0" encoding="utf-8"?>
+<p:sld xmlns:a="http://schemas.openxmlformats.org/drawingml/2006/main" xmlns:r="http://schemas.openxmlformats.org/officeDocument/2006/relationships" xmlns:p="http://schemas.openxmlformats.org/presentationml/2006/main" show="0">
   <p:cSld>
     <p:spTree>
       <p:nvGrpSpPr>
@@ -12093,7 +13434,7 @@
             <a:fld id="{B5CEABB6-07DC-46E8-9B57-56EC44A396E5}" type="slidenum">
               <a:rPr lang="pt-PT" noProof="0" smtClean="0"/>
               <a:pPr rtl="0"/>
-              <a:t>4</a:t>
+              <a:t>6</a:t>
             </a:fld>
             <a:endParaRPr lang="pt-PT" noProof="0"/>
           </a:p>
@@ -12142,8 +13483,8 @@
 </p:sld>
 </file>
 
-<file path=ppt/slides/slide5.xml><?xml version="1.0" encoding="utf-8"?>
-<p:sld xmlns:a="http://schemas.openxmlformats.org/drawingml/2006/main" xmlns:r="http://schemas.openxmlformats.org/officeDocument/2006/relationships" xmlns:p="http://schemas.openxmlformats.org/presentationml/2006/main">
+<file path=ppt/slides/slide7.xml><?xml version="1.0" encoding="utf-8"?>
+<p:sld xmlns:a="http://schemas.openxmlformats.org/drawingml/2006/main" xmlns:r="http://schemas.openxmlformats.org/officeDocument/2006/relationships" xmlns:p="http://schemas.openxmlformats.org/presentationml/2006/main" show="0">
   <p:cSld>
     <p:spTree>
       <p:nvGrpSpPr>
@@ -12223,7 +13564,7 @@
             <a:fld id="{B5CEABB6-07DC-46E8-9B57-56EC44A396E5}" type="slidenum">
               <a:rPr lang="pt-PT" noProof="0" smtClean="0"/>
               <a:pPr rtl="0"/>
-              <a:t>5</a:t>
+              <a:t>7</a:t>
             </a:fld>
             <a:endParaRPr lang="pt-PT" noProof="0"/>
           </a:p>
@@ -12362,8 +13703,8 @@
 </p:sld>
 </file>
 
-<file path=ppt/slides/slide6.xml><?xml version="1.0" encoding="utf-8"?>
-<p:sld xmlns:a="http://schemas.openxmlformats.org/drawingml/2006/main" xmlns:r="http://schemas.openxmlformats.org/officeDocument/2006/relationships" xmlns:p="http://schemas.openxmlformats.org/presentationml/2006/main">
+<file path=ppt/slides/slide8.xml><?xml version="1.0" encoding="utf-8"?>
+<p:sld xmlns:a="http://schemas.openxmlformats.org/drawingml/2006/main" xmlns:r="http://schemas.openxmlformats.org/officeDocument/2006/relationships" xmlns:p="http://schemas.openxmlformats.org/presentationml/2006/main" show="0">
   <p:cSld>
     <p:spTree>
       <p:nvGrpSpPr>
@@ -12443,7 +13784,7 @@
             <a:fld id="{B5CEABB6-07DC-46E8-9B57-56EC44A396E5}" type="slidenum">
               <a:rPr lang="pt-PT" noProof="0" smtClean="0"/>
               <a:pPr rtl="0"/>
-              <a:t>6</a:t>
+              <a:t>8</a:t>
             </a:fld>
             <a:endParaRPr lang="pt-PT" noProof="0"/>
           </a:p>
@@ -12492,8 +13833,8 @@
 </p:sld>
 </file>
 
-<file path=ppt/slides/slide7.xml><?xml version="1.0" encoding="utf-8"?>
-<p:sld xmlns:a="http://schemas.openxmlformats.org/drawingml/2006/main" xmlns:r="http://schemas.openxmlformats.org/officeDocument/2006/relationships" xmlns:p="http://schemas.openxmlformats.org/presentationml/2006/main">
+<file path=ppt/slides/slide9.xml><?xml version="1.0" encoding="utf-8"?>
+<p:sld xmlns:a="http://schemas.openxmlformats.org/drawingml/2006/main" xmlns:r="http://schemas.openxmlformats.org/officeDocument/2006/relationships" xmlns:p="http://schemas.openxmlformats.org/presentationml/2006/main" show="0">
   <p:cSld>
     <p:spTree>
       <p:nvGrpSpPr>
@@ -12575,7 +13916,7 @@
             <a:fld id="{B5CEABB6-07DC-46E8-9B57-56EC44A396E5}" type="slidenum">
               <a:rPr lang="pt-PT" noProof="0" smtClean="0"/>
               <a:pPr rtl="0"/>
-              <a:t>7</a:t>
+              <a:t>9</a:t>
             </a:fld>
             <a:endParaRPr lang="pt-PT" noProof="0"/>
           </a:p>
@@ -12615,358 +13956,6 @@
     <p:extLst>
       <p:ext uri="{BB962C8B-B14F-4D97-AF65-F5344CB8AC3E}">
         <p14:creationId xmlns:p14="http://schemas.microsoft.com/office/powerpoint/2010/main" val="3618834823"/>
-      </p:ext>
-    </p:extLst>
-  </p:cSld>
-  <p:clrMapOvr>
-    <a:masterClrMapping/>
-  </p:clrMapOvr>
-</p:sld>
-</file>
-
-<file path=ppt/slides/slide8.xml><?xml version="1.0" encoding="utf-8"?>
-<p:sld xmlns:a="http://schemas.openxmlformats.org/drawingml/2006/main" xmlns:r="http://schemas.openxmlformats.org/officeDocument/2006/relationships" xmlns:p="http://schemas.openxmlformats.org/presentationml/2006/main">
-  <p:cSld>
-    <p:spTree>
-      <p:nvGrpSpPr>
-        <p:cNvPr id="1" name="">
-          <a:extLst>
-            <a:ext uri="{FF2B5EF4-FFF2-40B4-BE49-F238E27FC236}">
-              <a16:creationId xmlns:a16="http://schemas.microsoft.com/office/drawing/2014/main" id="{74E82592-AE30-A049-9E5C-8AAD57F9024E}"/>
-            </a:ext>
-          </a:extLst>
-        </p:cNvPr>
-        <p:cNvGrpSpPr/>
-        <p:nvPr/>
-      </p:nvGrpSpPr>
-      <p:grpSpPr>
-        <a:xfrm>
-          <a:off x="0" y="0"/>
-          <a:ext cx="0" cy="0"/>
-          <a:chOff x="0" y="0"/>
-          <a:chExt cx="0" cy="0"/>
-        </a:xfrm>
-      </p:grpSpPr>
-      <p:sp>
-        <p:nvSpPr>
-          <p:cNvPr id="2" name="Title 1">
-            <a:extLst>
-              <a:ext uri="{FF2B5EF4-FFF2-40B4-BE49-F238E27FC236}">
-                <a16:creationId xmlns:a16="http://schemas.microsoft.com/office/drawing/2014/main" id="{750CD660-1A7E-31C5-4DF6-8CA8D4775B64}"/>
-              </a:ext>
-            </a:extLst>
-          </p:cNvPr>
-          <p:cNvSpPr>
-            <a:spLocks noGrp="1"/>
-          </p:cNvSpPr>
-          <p:nvPr>
-            <p:ph type="title"/>
-          </p:nvPr>
-        </p:nvSpPr>
-        <p:spPr>
-          <a:xfrm>
-            <a:off x="3253740" y="259589"/>
-            <a:ext cx="5684520" cy="821815"/>
-          </a:xfrm>
-        </p:spPr>
-        <p:txBody>
-          <a:bodyPr>
-            <a:normAutofit/>
-          </a:bodyPr>
-          <a:lstStyle/>
-          <a:p>
-            <a:r>
-              <a:rPr lang="pt-PT" dirty="0"/>
-              <a:t>Variabilidade NO2</a:t>
-            </a:r>
-          </a:p>
-        </p:txBody>
-      </p:sp>
-      <p:sp>
-        <p:nvSpPr>
-          <p:cNvPr id="6" name="Slide Number Placeholder 5">
-            <a:extLst>
-              <a:ext uri="{FF2B5EF4-FFF2-40B4-BE49-F238E27FC236}">
-                <a16:creationId xmlns:a16="http://schemas.microsoft.com/office/drawing/2014/main" id="{36B05E35-6DF7-329F-9F32-9937C69CCBBC}"/>
-              </a:ext>
-            </a:extLst>
-          </p:cNvPr>
-          <p:cNvSpPr>
-            <a:spLocks noGrp="1"/>
-          </p:cNvSpPr>
-          <p:nvPr>
-            <p:ph type="sldNum" sz="quarter" idx="12"/>
-          </p:nvPr>
-        </p:nvSpPr>
-        <p:spPr/>
-        <p:txBody>
-          <a:bodyPr/>
-          <a:lstStyle/>
-          <a:p>
-            <a:pPr rtl="0"/>
-            <a:fld id="{B5CEABB6-07DC-46E8-9B57-56EC44A396E5}" type="slidenum">
-              <a:rPr lang="pt-PT" noProof="0" smtClean="0"/>
-              <a:pPr rtl="0"/>
-              <a:t>8</a:t>
-            </a:fld>
-            <a:endParaRPr lang="pt-PT" noProof="0"/>
-          </a:p>
-        </p:txBody>
-      </p:sp>
-      <p:pic>
-        <p:nvPicPr>
-          <p:cNvPr id="4" name="Picture 3" descr="A graph of blue squares&#10;&#10;AI-generated content may be incorrect.">
-            <a:extLst>
-              <a:ext uri="{FF2B5EF4-FFF2-40B4-BE49-F238E27FC236}">
-                <a16:creationId xmlns:a16="http://schemas.microsoft.com/office/drawing/2014/main" id="{86AEF84D-594D-808E-4AE7-BC76051E7716}"/>
-              </a:ext>
-            </a:extLst>
-          </p:cNvPr>
-          <p:cNvPicPr>
-            <a:picLocks noChangeAspect="1"/>
-          </p:cNvPicPr>
-          <p:nvPr/>
-        </p:nvPicPr>
-        <p:blipFill>
-          <a:blip r:embed="rId2"/>
-          <a:stretch>
-            <a:fillRect/>
-          </a:stretch>
-        </p:blipFill>
-        <p:spPr>
-          <a:xfrm>
-            <a:off x="0" y="1081088"/>
-            <a:ext cx="5772145" cy="2861820"/>
-          </a:xfrm>
-          <a:prstGeom prst="rect">
-            <a:avLst/>
-          </a:prstGeom>
-        </p:spPr>
-      </p:pic>
-      <p:pic>
-        <p:nvPicPr>
-          <p:cNvPr id="9" name="Picture 8" descr="A graph of blue squares&#10;&#10;AI-generated content may be incorrect.">
-            <a:extLst>
-              <a:ext uri="{FF2B5EF4-FFF2-40B4-BE49-F238E27FC236}">
-                <a16:creationId xmlns:a16="http://schemas.microsoft.com/office/drawing/2014/main" id="{BEFA5603-46FA-D5B4-402A-F0094BDEC39E}"/>
-              </a:ext>
-            </a:extLst>
-          </p:cNvPr>
-          <p:cNvPicPr>
-            <a:picLocks noChangeAspect="1"/>
-          </p:cNvPicPr>
-          <p:nvPr/>
-        </p:nvPicPr>
-        <p:blipFill>
-          <a:blip r:embed="rId3"/>
-          <a:stretch>
-            <a:fillRect/>
-          </a:stretch>
-        </p:blipFill>
-        <p:spPr>
-          <a:xfrm>
-            <a:off x="0" y="3996180"/>
-            <a:ext cx="5767294" cy="2861820"/>
-          </a:xfrm>
-          <a:prstGeom prst="rect">
-            <a:avLst/>
-          </a:prstGeom>
-        </p:spPr>
-      </p:pic>
-      <p:pic>
-        <p:nvPicPr>
-          <p:cNvPr id="15" name="Picture 14" descr="A graph of blue squares&#10;&#10;AI-generated content may be incorrect.">
-            <a:extLst>
-              <a:ext uri="{FF2B5EF4-FFF2-40B4-BE49-F238E27FC236}">
-                <a16:creationId xmlns:a16="http://schemas.microsoft.com/office/drawing/2014/main" id="{1D96CD75-61F1-0FF0-368C-6FBB9CA4AD49}"/>
-              </a:ext>
-            </a:extLst>
-          </p:cNvPr>
-          <p:cNvPicPr>
-            <a:picLocks noChangeAspect="1"/>
-          </p:cNvPicPr>
-          <p:nvPr/>
-        </p:nvPicPr>
-        <p:blipFill>
-          <a:blip r:embed="rId4"/>
-          <a:stretch>
-            <a:fillRect/>
-          </a:stretch>
-        </p:blipFill>
-        <p:spPr>
-          <a:xfrm>
-            <a:off x="6419854" y="1081088"/>
-            <a:ext cx="5772145" cy="2864227"/>
-          </a:xfrm>
-          <a:prstGeom prst="rect">
-            <a:avLst/>
-          </a:prstGeom>
-        </p:spPr>
-      </p:pic>
-      <p:pic>
-        <p:nvPicPr>
-          <p:cNvPr id="17" name="Picture 16" descr="A graph of blue squares&#10;&#10;AI-generated content may be incorrect.">
-            <a:extLst>
-              <a:ext uri="{FF2B5EF4-FFF2-40B4-BE49-F238E27FC236}">
-                <a16:creationId xmlns:a16="http://schemas.microsoft.com/office/drawing/2014/main" id="{4621085C-A5E0-D694-DAB6-A83D1BCD69C0}"/>
-              </a:ext>
-            </a:extLst>
-          </p:cNvPr>
-          <p:cNvPicPr>
-            <a:picLocks noChangeAspect="1"/>
-          </p:cNvPicPr>
-          <p:nvPr/>
-        </p:nvPicPr>
-        <p:blipFill>
-          <a:blip r:embed="rId5"/>
-          <a:stretch>
-            <a:fillRect/>
-          </a:stretch>
-        </p:blipFill>
-        <p:spPr>
-          <a:xfrm>
-            <a:off x="6419854" y="3993773"/>
-            <a:ext cx="5772146" cy="2864227"/>
-          </a:xfrm>
-          <a:prstGeom prst="rect">
-            <a:avLst/>
-          </a:prstGeom>
-        </p:spPr>
-      </p:pic>
-    </p:spTree>
-    <p:extLst>
-      <p:ext uri="{BB962C8B-B14F-4D97-AF65-F5344CB8AC3E}">
-        <p14:creationId xmlns:p14="http://schemas.microsoft.com/office/powerpoint/2010/main" val="14021505"/>
-      </p:ext>
-    </p:extLst>
-  </p:cSld>
-  <p:clrMapOvr>
-    <a:masterClrMapping/>
-  </p:clrMapOvr>
-</p:sld>
-</file>
-
-<file path=ppt/slides/slide9.xml><?xml version="1.0" encoding="utf-8"?>
-<p:sld xmlns:a="http://schemas.openxmlformats.org/drawingml/2006/main" xmlns:r="http://schemas.openxmlformats.org/officeDocument/2006/relationships" xmlns:p="http://schemas.openxmlformats.org/presentationml/2006/main">
-  <p:cSld>
-    <p:spTree>
-      <p:nvGrpSpPr>
-        <p:cNvPr id="1" name="">
-          <a:extLst>
-            <a:ext uri="{FF2B5EF4-FFF2-40B4-BE49-F238E27FC236}">
-              <a16:creationId xmlns:a16="http://schemas.microsoft.com/office/drawing/2014/main" id="{5511CA13-20B2-E4C8-0D0C-800766284FE5}"/>
-            </a:ext>
-          </a:extLst>
-        </p:cNvPr>
-        <p:cNvGrpSpPr/>
-        <p:nvPr/>
-      </p:nvGrpSpPr>
-      <p:grpSpPr>
-        <a:xfrm>
-          <a:off x="0" y="0"/>
-          <a:ext cx="0" cy="0"/>
-          <a:chOff x="0" y="0"/>
-          <a:chExt cx="0" cy="0"/>
-        </a:xfrm>
-      </p:grpSpPr>
-      <p:sp>
-        <p:nvSpPr>
-          <p:cNvPr id="2" name="Title 1">
-            <a:extLst>
-              <a:ext uri="{FF2B5EF4-FFF2-40B4-BE49-F238E27FC236}">
-                <a16:creationId xmlns:a16="http://schemas.microsoft.com/office/drawing/2014/main" id="{D7D2825B-47A0-31B8-D396-C1FF9762A165}"/>
-              </a:ext>
-            </a:extLst>
-          </p:cNvPr>
-          <p:cNvSpPr>
-            <a:spLocks noGrp="1"/>
-          </p:cNvSpPr>
-          <p:nvPr>
-            <p:ph type="title"/>
-          </p:nvPr>
-        </p:nvSpPr>
-        <p:spPr>
-          <a:xfrm>
-            <a:off x="3253740" y="259589"/>
-            <a:ext cx="5684520" cy="821815"/>
-          </a:xfrm>
-        </p:spPr>
-        <p:txBody>
-          <a:bodyPr/>
-          <a:lstStyle/>
-          <a:p>
-            <a:r>
-              <a:rPr lang="pt-PT" dirty="0"/>
-              <a:t>Time Series NO</a:t>
-            </a:r>
-          </a:p>
-        </p:txBody>
-      </p:sp>
-      <p:sp>
-        <p:nvSpPr>
-          <p:cNvPr id="6" name="Slide Number Placeholder 5">
-            <a:extLst>
-              <a:ext uri="{FF2B5EF4-FFF2-40B4-BE49-F238E27FC236}">
-                <a16:creationId xmlns:a16="http://schemas.microsoft.com/office/drawing/2014/main" id="{32BE4E72-7537-299C-8983-D187F218524C}"/>
-              </a:ext>
-            </a:extLst>
-          </p:cNvPr>
-          <p:cNvSpPr>
-            <a:spLocks noGrp="1"/>
-          </p:cNvSpPr>
-          <p:nvPr>
-            <p:ph type="sldNum" sz="quarter" idx="12"/>
-          </p:nvPr>
-        </p:nvSpPr>
-        <p:spPr/>
-        <p:txBody>
-          <a:bodyPr/>
-          <a:lstStyle/>
-          <a:p>
-            <a:pPr rtl="0"/>
-            <a:fld id="{B5CEABB6-07DC-46E8-9B57-56EC44A396E5}" type="slidenum">
-              <a:rPr lang="pt-PT" noProof="0" smtClean="0"/>
-              <a:pPr rtl="0"/>
-              <a:t>9</a:t>
-            </a:fld>
-            <a:endParaRPr lang="pt-PT" noProof="0"/>
-          </a:p>
-        </p:txBody>
-      </p:sp>
-      <p:pic>
-        <p:nvPicPr>
-          <p:cNvPr id="8" name="Picture 7" descr="A graph with numbers and lines&#10;&#10;AI-generated content may be incorrect.">
-            <a:extLst>
-              <a:ext uri="{FF2B5EF4-FFF2-40B4-BE49-F238E27FC236}">
-                <a16:creationId xmlns:a16="http://schemas.microsoft.com/office/drawing/2014/main" id="{854D4A07-E4A5-8B0A-1FAE-102EFE450B5A}"/>
-              </a:ext>
-            </a:extLst>
-          </p:cNvPr>
-          <p:cNvPicPr>
-            <a:picLocks noChangeAspect="1"/>
-          </p:cNvPicPr>
-          <p:nvPr/>
-        </p:nvPicPr>
-        <p:blipFill>
-          <a:blip r:embed="rId2"/>
-          <a:stretch>
-            <a:fillRect/>
-          </a:stretch>
-        </p:blipFill>
-        <p:spPr>
-          <a:xfrm>
-            <a:off x="996696" y="1476294"/>
-            <a:ext cx="10198608" cy="5062618"/>
-          </a:xfrm>
-          <a:prstGeom prst="rect">
-            <a:avLst/>
-          </a:prstGeom>
-        </p:spPr>
-      </p:pic>
-    </p:spTree>
-    <p:extLst>
-      <p:ext uri="{BB962C8B-B14F-4D97-AF65-F5344CB8AC3E}">
-        <p14:creationId xmlns:p14="http://schemas.microsoft.com/office/powerpoint/2010/main" val="497250946"/>
       </p:ext>
     </p:extLst>
   </p:cSld>
@@ -13787,15 +14776,6 @@
 </file>
 
 <file path=customXml/item2.xml><?xml version="1.0" encoding="utf-8"?>
-<?mso-contentType ?>
-<FormTemplates xmlns="http://schemas.microsoft.com/sharepoint/v3/contenttype/forms">
-  <Display>DocumentLibraryForm</Display>
-  <Edit>DocumentLibraryForm</Edit>
-  <New>DocumentLibraryForm</New>
-</FormTemplates>
-</file>
-
-<file path=customXml/item3.xml><?xml version="1.0" encoding="utf-8"?>
 <ct:contentTypeSchema xmlns:ct="http://schemas.microsoft.com/office/2006/metadata/contentType" xmlns:ma="http://schemas.microsoft.com/office/2006/metadata/properties/metaAttributes" ct:_="" ma:_="" ma:contentTypeName="Document" ma:contentTypeID="0x01010079F111ED35F8CC479449609E8A0923A6" ma:contentTypeVersion="21" ma:contentTypeDescription="Create a new document." ma:contentTypeScope="" ma:versionID="64dfb1555687e0874b4304b796b5b0c7">
   <xsd:schema xmlns:xsd="http://www.w3.org/2001/XMLSchema" xmlns:xs="http://www.w3.org/2001/XMLSchema" xmlns:p="http://schemas.microsoft.com/office/2006/metadata/properties" xmlns:ns1="http://schemas.microsoft.com/sharepoint/v3" xmlns:ns2="71af3243-3dd4-4a8d-8c0d-dd76da1f02a5" xmlns:ns3="16c05727-aa75-4e4a-9b5f-8a80a1165891" xmlns:ns4="230e9df3-be65-4c73-a93b-d1236ebd677e" targetNamespace="http://schemas.microsoft.com/office/2006/metadata/properties" ma:root="true" ma:fieldsID="e6e4c555b5e194d05b7203de9c4567b3" ns1:_="" ns2:_="" ns3:_="" ns4:_="">
     <xsd:import namespace="http://schemas.microsoft.com/sharepoint/v3"/>
@@ -14077,6 +15057,15 @@
 </ct:contentTypeSchema>
 </file>
 
+<file path=customXml/item3.xml><?xml version="1.0" encoding="utf-8"?>
+<?mso-contentType ?>
+<FormTemplates xmlns="http://schemas.microsoft.com/sharepoint/v3/contenttype/forms">
+  <Display>DocumentLibraryForm</Display>
+  <Edit>DocumentLibraryForm</Edit>
+  <New>DocumentLibraryForm</New>
+</FormTemplates>
+</file>
+
 <file path=customXml/itemProps1.xml><?xml version="1.0" encoding="utf-8"?>
 <ds:datastoreItem xmlns:ds="http://schemas.openxmlformats.org/officeDocument/2006/customXml" ds:itemID="{CA4F7154-AFAC-4BE7-8A74-7F4B6FC2743C}">
   <ds:schemaRefs>
@@ -14090,14 +15079,6 @@
 </file>
 
 <file path=customXml/itemProps2.xml><?xml version="1.0" encoding="utf-8"?>
-<ds:datastoreItem xmlns:ds="http://schemas.openxmlformats.org/officeDocument/2006/customXml" ds:itemID="{E618C13B-9D83-4AF4-B64D-33362D5133F8}">
-  <ds:schemaRefs>
-    <ds:schemaRef ds:uri="http://schemas.microsoft.com/sharepoint/v3/contenttype/forms"/>
-  </ds:schemaRefs>
-</ds:datastoreItem>
-</file>
-
-<file path=customXml/itemProps3.xml><?xml version="1.0" encoding="utf-8"?>
 <ds:datastoreItem xmlns:ds="http://schemas.openxmlformats.org/officeDocument/2006/customXml" ds:itemID="{67ACD96E-49A0-4DA4-A7BB-AC2D8874213F}">
   <ds:schemaRefs>
     <ds:schemaRef ds:uri="http://schemas.microsoft.com/office/2006/metadata/contentType"/>
@@ -14118,6 +15099,14 @@
 </ds:datastoreItem>
 </file>
 
+<file path=customXml/itemProps3.xml><?xml version="1.0" encoding="utf-8"?>
+<ds:datastoreItem xmlns:ds="http://schemas.openxmlformats.org/officeDocument/2006/customXml" ds:itemID="{E618C13B-9D83-4AF4-B64D-33362D5133F8}">
+  <ds:schemaRefs>
+    <ds:schemaRef ds:uri="http://schemas.microsoft.com/sharepoint/v3/contenttype/forms"/>
+  </ds:schemaRefs>
+</ds:datastoreItem>
+</file>
+
 <file path=docMetadata/LabelInfo.xml><?xml version="1.0" encoding="utf-8"?>
 <clbl:labelList xmlns:clbl="http://schemas.microsoft.com/office/2020/mipLabelMetadata">
   <clbl:label id="{f42aa342-8706-4288-bd11-ebb85995028c}" enabled="1" method="Standard" siteId="{72f988bf-86f1-41af-91ab-2d7cd011db47}" removed="0"/>

</xml_diff>